<commit_message>
added new CMAC functional architecture design
git-svn-id: file:///repo/trunk@58 7b6b0737-f4d6-4764-b6e6-6b822f93333f
</commit_message>
<xml_diff>
--- a/doc/sample_charts_for_edu.pptx
+++ b/doc/sample_charts_for_edu.pptx
@@ -8,6 +8,7 @@
     <p:sldId id="256" r:id="rId2"/>
     <p:sldId id="257" r:id="rId3"/>
     <p:sldId id="258" r:id="rId4"/>
+    <p:sldId id="259" r:id="rId5"/>
   </p:sldIdLst>
   <p:sldSz cx="9144000" cy="6858000" type="screen4x3"/>
   <p:notesSz cx="6858000" cy="9144000"/>
@@ -290,7 +291,7 @@
           <a:p>
             <a:fld id="{90D9B3FD-07EB-4049-A194-E39A30753EB9}" type="datetimeFigureOut">
               <a:rPr lang="en-US" smtClean="0"/>
-              <a:t>11/6/12</a:t>
+              <a:t>12/1/12</a:t>
             </a:fld>
             <a:endParaRPr lang="en-US"/>
           </a:p>
@@ -460,7 +461,7 @@
           <a:p>
             <a:fld id="{90D9B3FD-07EB-4049-A194-E39A30753EB9}" type="datetimeFigureOut">
               <a:rPr lang="en-US" smtClean="0"/>
-              <a:t>11/6/12</a:t>
+              <a:t>12/1/12</a:t>
             </a:fld>
             <a:endParaRPr lang="en-US"/>
           </a:p>
@@ -640,7 +641,7 @@
           <a:p>
             <a:fld id="{90D9B3FD-07EB-4049-A194-E39A30753EB9}" type="datetimeFigureOut">
               <a:rPr lang="en-US" smtClean="0"/>
-              <a:t>11/6/12</a:t>
+              <a:t>12/1/12</a:t>
             </a:fld>
             <a:endParaRPr lang="en-US"/>
           </a:p>
@@ -810,7 +811,7 @@
           <a:p>
             <a:fld id="{90D9B3FD-07EB-4049-A194-E39A30753EB9}" type="datetimeFigureOut">
               <a:rPr lang="en-US" smtClean="0"/>
-              <a:t>11/6/12</a:t>
+              <a:t>12/1/12</a:t>
             </a:fld>
             <a:endParaRPr lang="en-US"/>
           </a:p>
@@ -1056,7 +1057,7 @@
           <a:p>
             <a:fld id="{90D9B3FD-07EB-4049-A194-E39A30753EB9}" type="datetimeFigureOut">
               <a:rPr lang="en-US" smtClean="0"/>
-              <a:t>11/6/12</a:t>
+              <a:t>12/1/12</a:t>
             </a:fld>
             <a:endParaRPr lang="en-US"/>
           </a:p>
@@ -1344,7 +1345,7 @@
           <a:p>
             <a:fld id="{90D9B3FD-07EB-4049-A194-E39A30753EB9}" type="datetimeFigureOut">
               <a:rPr lang="en-US" smtClean="0"/>
-              <a:t>11/6/12</a:t>
+              <a:t>12/1/12</a:t>
             </a:fld>
             <a:endParaRPr lang="en-US"/>
           </a:p>
@@ -1766,7 +1767,7 @@
           <a:p>
             <a:fld id="{90D9B3FD-07EB-4049-A194-E39A30753EB9}" type="datetimeFigureOut">
               <a:rPr lang="en-US" smtClean="0"/>
-              <a:t>11/6/12</a:t>
+              <a:t>12/1/12</a:t>
             </a:fld>
             <a:endParaRPr lang="en-US"/>
           </a:p>
@@ -1884,7 +1885,7 @@
           <a:p>
             <a:fld id="{90D9B3FD-07EB-4049-A194-E39A30753EB9}" type="datetimeFigureOut">
               <a:rPr lang="en-US" smtClean="0"/>
-              <a:t>11/6/12</a:t>
+              <a:t>12/1/12</a:t>
             </a:fld>
             <a:endParaRPr lang="en-US"/>
           </a:p>
@@ -1979,7 +1980,7 @@
           <a:p>
             <a:fld id="{90D9B3FD-07EB-4049-A194-E39A30753EB9}" type="datetimeFigureOut">
               <a:rPr lang="en-US" smtClean="0"/>
-              <a:t>11/6/12</a:t>
+              <a:t>12/1/12</a:t>
             </a:fld>
             <a:endParaRPr lang="en-US"/>
           </a:p>
@@ -2256,7 +2257,7 @@
           <a:p>
             <a:fld id="{90D9B3FD-07EB-4049-A194-E39A30753EB9}" type="datetimeFigureOut">
               <a:rPr lang="en-US" smtClean="0"/>
-              <a:t>11/6/12</a:t>
+              <a:t>12/1/12</a:t>
             </a:fld>
             <a:endParaRPr lang="en-US"/>
           </a:p>
@@ -2509,7 +2510,7 @@
           <a:p>
             <a:fld id="{90D9B3FD-07EB-4049-A194-E39A30753EB9}" type="datetimeFigureOut">
               <a:rPr lang="en-US" smtClean="0"/>
-              <a:t>11/6/12</a:t>
+              <a:t>12/1/12</a:t>
             </a:fld>
             <a:endParaRPr lang="en-US"/>
           </a:p>
@@ -2722,7 +2723,7 @@
           <a:p>
             <a:fld id="{90D9B3FD-07EB-4049-A194-E39A30753EB9}" type="datetimeFigureOut">
               <a:rPr lang="en-US" smtClean="0"/>
-              <a:t>11/6/12</a:t>
+              <a:t>12/1/12</a:t>
             </a:fld>
             <a:endParaRPr lang="en-US"/>
           </a:p>
@@ -6208,6 +6209,2838 @@
 </p:sld>
 </file>
 
+<file path=ppt/slides/slide4.xml><?xml version="1.0" encoding="utf-8"?>
+<p:sld xmlns:a="http://schemas.openxmlformats.org/drawingml/2006/main" xmlns:r="http://schemas.openxmlformats.org/officeDocument/2006/relationships" xmlns:p="http://schemas.openxmlformats.org/presentationml/2006/main">
+  <p:cSld>
+    <p:spTree>
+      <p:nvGrpSpPr>
+        <p:cNvPr id="1" name=""/>
+        <p:cNvGrpSpPr/>
+        <p:nvPr/>
+      </p:nvGrpSpPr>
+      <p:grpSpPr>
+        <a:xfrm>
+          <a:off x="0" y="0"/>
+          <a:ext cx="0" cy="0"/>
+          <a:chOff x="0" y="0"/>
+          <a:chExt cx="0" cy="0"/>
+        </a:xfrm>
+      </p:grpSpPr>
+      <p:grpSp>
+        <p:nvGrpSpPr>
+          <p:cNvPr id="147" name="Group 146"/>
+          <p:cNvGrpSpPr/>
+          <p:nvPr/>
+        </p:nvGrpSpPr>
+        <p:grpSpPr>
+          <a:xfrm>
+            <a:off x="808038" y="543739"/>
+            <a:ext cx="7952373" cy="5508238"/>
+            <a:chOff x="808038" y="543739"/>
+            <a:chExt cx="7952373" cy="5508238"/>
+          </a:xfrm>
+        </p:grpSpPr>
+        <p:pic>
+          <p:nvPicPr>
+            <p:cNvPr id="13" name="Picture 3" descr="client.tiff"/>
+            <p:cNvPicPr>
+              <a:picLocks noChangeAspect="1"/>
+            </p:cNvPicPr>
+            <p:nvPr/>
+          </p:nvPicPr>
+          <p:blipFill>
+            <a:blip r:embed="rId2"/>
+            <a:srcRect/>
+            <a:stretch>
+              <a:fillRect/>
+            </a:stretch>
+          </p:blipFill>
+          <p:spPr bwMode="auto">
+            <a:xfrm>
+              <a:off x="3967163" y="543739"/>
+              <a:ext cx="690562" cy="558800"/>
+            </a:xfrm>
+            <a:prstGeom prst="rect">
+              <a:avLst/>
+            </a:prstGeom>
+            <a:noFill/>
+            <a:ln w="9525">
+              <a:noFill/>
+              <a:miter lim="800000"/>
+              <a:headEnd/>
+              <a:tailEnd/>
+            </a:ln>
+          </p:spPr>
+        </p:pic>
+        <p:pic>
+          <p:nvPicPr>
+            <p:cNvPr id="14" name="Picture 4" descr="server.tiff"/>
+            <p:cNvPicPr>
+              <a:picLocks noChangeAspect="1"/>
+            </p:cNvPicPr>
+            <p:nvPr/>
+          </p:nvPicPr>
+          <p:blipFill>
+            <a:blip r:embed="rId3"/>
+            <a:srcRect/>
+            <a:stretch>
+              <a:fillRect/>
+            </a:stretch>
+          </p:blipFill>
+          <p:spPr bwMode="auto">
+            <a:xfrm>
+              <a:off x="3725008" y="4693360"/>
+              <a:ext cx="406400" cy="923925"/>
+            </a:xfrm>
+            <a:prstGeom prst="rect">
+              <a:avLst/>
+            </a:prstGeom>
+            <a:noFill/>
+            <a:ln w="9525">
+              <a:noFill/>
+              <a:miter lim="800000"/>
+              <a:headEnd/>
+              <a:tailEnd/>
+            </a:ln>
+          </p:spPr>
+        </p:pic>
+        <p:sp>
+          <p:nvSpPr>
+            <p:cNvPr id="15" name="Rounded Rectangle 14"/>
+            <p:cNvSpPr/>
+            <p:nvPr/>
+          </p:nvSpPr>
+          <p:spPr>
+            <a:xfrm>
+              <a:off x="1598613" y="3226854"/>
+              <a:ext cx="5887507" cy="1243012"/>
+            </a:xfrm>
+            <a:prstGeom prst="roundRect">
+              <a:avLst/>
+            </a:prstGeom>
+          </p:spPr>
+          <p:style>
+            <a:lnRef idx="1">
+              <a:schemeClr val="accent1"/>
+            </a:lnRef>
+            <a:fillRef idx="3">
+              <a:schemeClr val="accent1"/>
+            </a:fillRef>
+            <a:effectRef idx="2">
+              <a:schemeClr val="accent1"/>
+            </a:effectRef>
+            <a:fontRef idx="minor">
+              <a:schemeClr val="lt1"/>
+            </a:fontRef>
+          </p:style>
+          <p:txBody>
+            <a:bodyPr anchor="ctr"/>
+            <a:lstStyle/>
+            <a:p>
+              <a:pPr algn="ctr" fontAlgn="auto">
+                <a:spcBef>
+                  <a:spcPts val="0"/>
+                </a:spcBef>
+                <a:spcAft>
+                  <a:spcPts val="0"/>
+                </a:spcAft>
+                <a:defRPr/>
+              </a:pPr>
+              <a:endParaRPr lang="en-US" dirty="0"/>
+            </a:p>
+          </p:txBody>
+        </p:sp>
+        <p:sp>
+          <p:nvSpPr>
+            <p:cNvPr id="16" name="Rounded Rectangle 15"/>
+            <p:cNvSpPr/>
+            <p:nvPr/>
+          </p:nvSpPr>
+          <p:spPr>
+            <a:xfrm>
+              <a:off x="1462088" y="1175564"/>
+              <a:ext cx="6094412" cy="314325"/>
+            </a:xfrm>
+            <a:prstGeom prst="roundRect">
+              <a:avLst/>
+            </a:prstGeom>
+          </p:spPr>
+          <p:style>
+            <a:lnRef idx="1">
+              <a:schemeClr val="accent1"/>
+            </a:lnRef>
+            <a:fillRef idx="3">
+              <a:schemeClr val="accent1"/>
+            </a:fillRef>
+            <a:effectRef idx="2">
+              <a:schemeClr val="accent1"/>
+            </a:effectRef>
+            <a:fontRef idx="minor">
+              <a:schemeClr val="lt1"/>
+            </a:fontRef>
+          </p:style>
+          <p:txBody>
+            <a:bodyPr anchor="ctr"/>
+            <a:lstStyle/>
+            <a:p>
+              <a:pPr algn="ctr" fontAlgn="auto">
+                <a:spcBef>
+                  <a:spcPts val="0"/>
+                </a:spcBef>
+                <a:spcAft>
+                  <a:spcPts val="0"/>
+                </a:spcAft>
+                <a:defRPr/>
+              </a:pPr>
+              <a:r>
+                <a:rPr lang="en-US" dirty="0" smtClean="0">
+                  <a:solidFill>
+                    <a:schemeClr val="tx1"/>
+                  </a:solidFill>
+                </a:rPr>
+                <a:t>Human or program clients</a:t>
+              </a:r>
+              <a:endParaRPr lang="en-US" dirty="0">
+                <a:solidFill>
+                  <a:schemeClr val="tx1"/>
+                </a:solidFill>
+              </a:endParaRPr>
+            </a:p>
+          </p:txBody>
+        </p:sp>
+        <p:pic>
+          <p:nvPicPr>
+            <p:cNvPr id="17" name="Picture 7" descr="server.tiff"/>
+            <p:cNvPicPr>
+              <a:picLocks noChangeAspect="1"/>
+            </p:cNvPicPr>
+            <p:nvPr/>
+          </p:nvPicPr>
+          <p:blipFill>
+            <a:blip r:embed="rId3"/>
+            <a:srcRect/>
+            <a:stretch>
+              <a:fillRect/>
+            </a:stretch>
+          </p:blipFill>
+          <p:spPr bwMode="auto">
+            <a:xfrm>
+              <a:off x="5021934" y="4693360"/>
+              <a:ext cx="407988" cy="923925"/>
+            </a:xfrm>
+            <a:prstGeom prst="rect">
+              <a:avLst/>
+            </a:prstGeom>
+            <a:noFill/>
+            <a:ln w="9525">
+              <a:noFill/>
+              <a:miter lim="800000"/>
+              <a:headEnd/>
+              <a:tailEnd/>
+            </a:ln>
+          </p:spPr>
+        </p:pic>
+        <p:pic>
+          <p:nvPicPr>
+            <p:cNvPr id="18" name="Picture 9" descr="client.tiff"/>
+            <p:cNvPicPr>
+              <a:picLocks noChangeAspect="1"/>
+            </p:cNvPicPr>
+            <p:nvPr/>
+          </p:nvPicPr>
+          <p:blipFill>
+            <a:blip r:embed="rId2"/>
+            <a:srcRect/>
+            <a:stretch>
+              <a:fillRect/>
+            </a:stretch>
+          </p:blipFill>
+          <p:spPr bwMode="auto">
+            <a:xfrm>
+              <a:off x="5410200" y="543739"/>
+              <a:ext cx="688975" cy="558800"/>
+            </a:xfrm>
+            <a:prstGeom prst="rect">
+              <a:avLst/>
+            </a:prstGeom>
+            <a:noFill/>
+            <a:ln w="9525">
+              <a:noFill/>
+              <a:miter lim="800000"/>
+              <a:headEnd/>
+              <a:tailEnd/>
+            </a:ln>
+          </p:spPr>
+        </p:pic>
+        <p:pic>
+          <p:nvPicPr>
+            <p:cNvPr id="19" name="Picture 10" descr="client.tiff"/>
+            <p:cNvPicPr>
+              <a:picLocks noChangeAspect="1"/>
+            </p:cNvPicPr>
+            <p:nvPr/>
+          </p:nvPicPr>
+          <p:blipFill>
+            <a:blip r:embed="rId2"/>
+            <a:srcRect/>
+            <a:stretch>
+              <a:fillRect/>
+            </a:stretch>
+          </p:blipFill>
+          <p:spPr bwMode="auto">
+            <a:xfrm>
+              <a:off x="2495550" y="543739"/>
+              <a:ext cx="688975" cy="558800"/>
+            </a:xfrm>
+            <a:prstGeom prst="rect">
+              <a:avLst/>
+            </a:prstGeom>
+            <a:noFill/>
+            <a:ln w="9525">
+              <a:noFill/>
+              <a:miter lim="800000"/>
+              <a:headEnd/>
+              <a:tailEnd/>
+            </a:ln>
+          </p:spPr>
+        </p:pic>
+        <p:sp>
+          <p:nvSpPr>
+            <p:cNvPr id="20" name="TextBox 19"/>
+            <p:cNvSpPr txBox="1"/>
+            <p:nvPr/>
+          </p:nvSpPr>
+          <p:spPr>
+            <a:xfrm>
+              <a:off x="3999621" y="1651814"/>
+              <a:ext cx="1018227" cy="338554"/>
+            </a:xfrm>
+            <a:prstGeom prst="rect">
+              <a:avLst/>
+            </a:prstGeom>
+          </p:spPr>
+          <p:style>
+            <a:lnRef idx="1">
+              <a:schemeClr val="accent3"/>
+            </a:lnRef>
+            <a:fillRef idx="3">
+              <a:schemeClr val="accent3"/>
+            </a:fillRef>
+            <a:effectRef idx="2">
+              <a:schemeClr val="accent3"/>
+            </a:effectRef>
+            <a:fontRef idx="minor">
+              <a:schemeClr val="lt1"/>
+            </a:fontRef>
+          </p:style>
+          <p:txBody>
+            <a:bodyPr wrap="none">
+              <a:spAutoFit/>
+            </a:bodyPr>
+            <a:lstStyle/>
+            <a:p>
+              <a:pPr fontAlgn="auto">
+                <a:spcBef>
+                  <a:spcPts val="0"/>
+                </a:spcBef>
+                <a:spcAft>
+                  <a:spcPts val="0"/>
+                </a:spcAft>
+                <a:defRPr/>
+              </a:pPr>
+              <a:r>
+                <a:rPr lang="en-US" sz="1600" b="1" dirty="0" smtClean="0">
+                  <a:solidFill>
+                    <a:srgbClr val="008000"/>
+                  </a:solidFill>
+                </a:rPr>
+                <a:t>Data </a:t>
+              </a:r>
+              <a:r>
+                <a:rPr lang="en-US" sz="1600" b="1" dirty="0" smtClean="0">
+                  <a:solidFill>
+                    <a:srgbClr val="008000"/>
+                  </a:solidFill>
+                </a:rPr>
+                <a:t>flow</a:t>
+              </a:r>
+              <a:endParaRPr lang="en-US" sz="1600" b="1" dirty="0">
+                <a:solidFill>
+                  <a:srgbClr val="008000"/>
+                </a:solidFill>
+              </a:endParaRPr>
+            </a:p>
+          </p:txBody>
+        </p:sp>
+        <p:sp>
+          <p:nvSpPr>
+            <p:cNvPr id="21" name="Oval 20"/>
+            <p:cNvSpPr>
+              <a:spLocks noChangeAspect="1"/>
+            </p:cNvSpPr>
+            <p:nvPr/>
+          </p:nvSpPr>
+          <p:spPr>
+            <a:xfrm>
+              <a:off x="1813332" y="3594142"/>
+              <a:ext cx="866538" cy="649057"/>
+            </a:xfrm>
+            <a:prstGeom prst="ellipse">
+              <a:avLst/>
+            </a:prstGeom>
+            <a:effectLst>
+              <a:outerShdw blurRad="180975" dist="114300" dir="9360000" sx="96000" sy="96000" algn="tl" rotWithShape="0">
+                <a:srgbClr val="000000">
+                  <a:alpha val="35000"/>
+                </a:srgbClr>
+              </a:outerShdw>
+            </a:effectLst>
+          </p:spPr>
+          <p:style>
+            <a:lnRef idx="1">
+              <a:schemeClr val="accent1"/>
+            </a:lnRef>
+            <a:fillRef idx="3">
+              <a:schemeClr val="accent1"/>
+            </a:fillRef>
+            <a:effectRef idx="2">
+              <a:schemeClr val="accent1"/>
+            </a:effectRef>
+            <a:fontRef idx="minor">
+              <a:schemeClr val="lt1"/>
+            </a:fontRef>
+          </p:style>
+          <p:txBody>
+            <a:bodyPr anchor="ctr"/>
+            <a:lstStyle/>
+            <a:p>
+              <a:pPr algn="ctr" fontAlgn="auto">
+                <a:spcBef>
+                  <a:spcPts val="0"/>
+                </a:spcBef>
+                <a:spcAft>
+                  <a:spcPts val="0"/>
+                </a:spcAft>
+                <a:defRPr/>
+              </a:pPr>
+              <a:r>
+                <a:rPr lang="en-US" sz="1100" dirty="0" smtClean="0"/>
+                <a:t>Search</a:t>
+              </a:r>
+              <a:endParaRPr lang="en-US" sz="1100" dirty="0"/>
+            </a:p>
+          </p:txBody>
+        </p:sp>
+        <p:sp>
+          <p:nvSpPr>
+            <p:cNvPr id="22" name="Oval 21"/>
+            <p:cNvSpPr>
+              <a:spLocks noChangeAspect="1"/>
+            </p:cNvSpPr>
+            <p:nvPr/>
+          </p:nvSpPr>
+          <p:spPr>
+            <a:xfrm>
+              <a:off x="2931762" y="3543068"/>
+              <a:ext cx="801977" cy="735171"/>
+            </a:xfrm>
+            <a:prstGeom prst="ellipse">
+              <a:avLst/>
+            </a:prstGeom>
+            <a:effectLst>
+              <a:outerShdw blurRad="180975" dist="114300" dir="9360000" sx="96000" sy="96000" algn="tl" rotWithShape="0">
+                <a:srgbClr val="000000">
+                  <a:alpha val="35000"/>
+                </a:srgbClr>
+              </a:outerShdw>
+            </a:effectLst>
+          </p:spPr>
+          <p:style>
+            <a:lnRef idx="1">
+              <a:schemeClr val="accent1"/>
+            </a:lnRef>
+            <a:fillRef idx="3">
+              <a:schemeClr val="accent1"/>
+            </a:fillRef>
+            <a:effectRef idx="2">
+              <a:schemeClr val="accent1"/>
+            </a:effectRef>
+            <a:fontRef idx="minor">
+              <a:schemeClr val="lt1"/>
+            </a:fontRef>
+          </p:style>
+          <p:txBody>
+            <a:bodyPr anchor="ctr"/>
+            <a:lstStyle/>
+            <a:p>
+              <a:pPr algn="ctr" fontAlgn="auto">
+                <a:spcBef>
+                  <a:spcPts val="0"/>
+                </a:spcBef>
+                <a:spcAft>
+                  <a:spcPts val="0"/>
+                </a:spcAft>
+                <a:defRPr/>
+              </a:pPr>
+              <a:r>
+                <a:rPr lang="en-US" sz="1100" dirty="0" smtClean="0"/>
+                <a:t>Subset</a:t>
+              </a:r>
+              <a:endParaRPr lang="en-US" sz="1100" dirty="0"/>
+            </a:p>
+          </p:txBody>
+        </p:sp>
+        <p:sp>
+          <p:nvSpPr>
+            <p:cNvPr id="23" name="Oval 22"/>
+            <p:cNvSpPr>
+              <a:spLocks noChangeAspect="1"/>
+            </p:cNvSpPr>
+            <p:nvPr/>
+          </p:nvSpPr>
+          <p:spPr>
+            <a:xfrm>
+              <a:off x="3919004" y="3535146"/>
+              <a:ext cx="1071322" cy="735171"/>
+            </a:xfrm>
+            <a:prstGeom prst="ellipse">
+              <a:avLst/>
+            </a:prstGeom>
+            <a:effectLst>
+              <a:outerShdw blurRad="180975" dist="114300" dir="9360000" sx="96000" sy="96000" algn="tl" rotWithShape="0">
+                <a:srgbClr val="000000">
+                  <a:alpha val="35000"/>
+                </a:srgbClr>
+              </a:outerShdw>
+            </a:effectLst>
+          </p:spPr>
+          <p:style>
+            <a:lnRef idx="1">
+              <a:schemeClr val="accent1"/>
+            </a:lnRef>
+            <a:fillRef idx="3">
+              <a:schemeClr val="accent1"/>
+            </a:fillRef>
+            <a:effectRef idx="2">
+              <a:schemeClr val="accent1"/>
+            </a:effectRef>
+            <a:fontRef idx="minor">
+              <a:schemeClr val="lt1"/>
+            </a:fontRef>
+          </p:style>
+          <p:txBody>
+            <a:bodyPr anchor="ctr"/>
+            <a:lstStyle/>
+            <a:p>
+              <a:pPr algn="ctr" fontAlgn="auto">
+                <a:spcBef>
+                  <a:spcPts val="0"/>
+                </a:spcBef>
+                <a:spcAft>
+                  <a:spcPts val="0"/>
+                </a:spcAft>
+                <a:defRPr/>
+              </a:pPr>
+              <a:r>
+                <a:rPr lang="en-US" sz="1100" dirty="0" smtClean="0"/>
+                <a:t>Co-locate</a:t>
+              </a:r>
+              <a:endParaRPr lang="en-US" sz="1100" dirty="0"/>
+            </a:p>
+          </p:txBody>
+        </p:sp>
+        <p:sp>
+          <p:nvSpPr>
+            <p:cNvPr id="24" name="Oval 23"/>
+            <p:cNvSpPr>
+              <a:spLocks noChangeAspect="1"/>
+            </p:cNvSpPr>
+            <p:nvPr/>
+          </p:nvSpPr>
+          <p:spPr>
+            <a:xfrm>
+              <a:off x="6403402" y="3511773"/>
+              <a:ext cx="898525" cy="735171"/>
+            </a:xfrm>
+            <a:prstGeom prst="ellipse">
+              <a:avLst/>
+            </a:prstGeom>
+            <a:effectLst>
+              <a:outerShdw blurRad="180975" dist="114300" dir="9360000" sx="96000" sy="96000" algn="tl" rotWithShape="0">
+                <a:srgbClr val="000000">
+                  <a:alpha val="35000"/>
+                </a:srgbClr>
+              </a:outerShdw>
+            </a:effectLst>
+          </p:spPr>
+          <p:style>
+            <a:lnRef idx="1">
+              <a:schemeClr val="accent1"/>
+            </a:lnRef>
+            <a:fillRef idx="3">
+              <a:schemeClr val="accent1"/>
+            </a:fillRef>
+            <a:effectRef idx="2">
+              <a:schemeClr val="accent1"/>
+            </a:effectRef>
+            <a:fontRef idx="minor">
+              <a:schemeClr val="lt1"/>
+            </a:fontRef>
+          </p:style>
+          <p:txBody>
+            <a:bodyPr anchor="ctr"/>
+            <a:lstStyle/>
+            <a:p>
+              <a:pPr algn="ctr" fontAlgn="auto">
+                <a:spcBef>
+                  <a:spcPts val="0"/>
+                </a:spcBef>
+                <a:spcAft>
+                  <a:spcPts val="0"/>
+                </a:spcAft>
+                <a:defRPr/>
+              </a:pPr>
+              <a:r>
+                <a:rPr lang="en-US" sz="1000" dirty="0" smtClean="0"/>
+                <a:t>Visualize</a:t>
+              </a:r>
+              <a:endParaRPr lang="en-US" sz="1000" dirty="0"/>
+            </a:p>
+          </p:txBody>
+        </p:sp>
+        <p:sp>
+          <p:nvSpPr>
+            <p:cNvPr id="25" name="Diamond 24"/>
+            <p:cNvSpPr/>
+            <p:nvPr/>
+          </p:nvSpPr>
+          <p:spPr>
+            <a:xfrm>
+              <a:off x="808038" y="2141568"/>
+              <a:ext cx="822325" cy="555625"/>
+            </a:xfrm>
+            <a:prstGeom prst="diamond">
+              <a:avLst/>
+            </a:prstGeom>
+          </p:spPr>
+          <p:style>
+            <a:lnRef idx="1">
+              <a:schemeClr val="accent1"/>
+            </a:lnRef>
+            <a:fillRef idx="3">
+              <a:schemeClr val="accent1"/>
+            </a:fillRef>
+            <a:effectRef idx="2">
+              <a:schemeClr val="accent1"/>
+            </a:effectRef>
+            <a:fontRef idx="minor">
+              <a:schemeClr val="lt1"/>
+            </a:fontRef>
+          </p:style>
+          <p:txBody>
+            <a:bodyPr anchor="ctr"/>
+            <a:lstStyle/>
+            <a:p>
+              <a:pPr algn="ctr" fontAlgn="auto">
+                <a:spcBef>
+                  <a:spcPts val="0"/>
+                </a:spcBef>
+                <a:spcAft>
+                  <a:spcPts val="0"/>
+                </a:spcAft>
+                <a:defRPr/>
+              </a:pPr>
+              <a:endParaRPr lang="en-US" dirty="0"/>
+            </a:p>
+          </p:txBody>
+        </p:sp>
+        <p:cxnSp>
+          <p:nvCxnSpPr>
+            <p:cNvPr id="26" name="Straight Arrow Connector 25"/>
+            <p:cNvCxnSpPr/>
+            <p:nvPr/>
+          </p:nvCxnSpPr>
+          <p:spPr>
+            <a:xfrm>
+              <a:off x="2255854" y="4301481"/>
+              <a:ext cx="299674" cy="334145"/>
+            </a:xfrm>
+            <a:prstGeom prst="straightConnector1">
+              <a:avLst/>
+            </a:prstGeom>
+            <a:ln>
+              <a:headEnd type="arrow"/>
+              <a:tailEnd type="arrow"/>
+            </a:ln>
+          </p:spPr>
+          <p:style>
+            <a:lnRef idx="2">
+              <a:schemeClr val="accent2"/>
+            </a:lnRef>
+            <a:fillRef idx="0">
+              <a:schemeClr val="accent2"/>
+            </a:fillRef>
+            <a:effectRef idx="1">
+              <a:schemeClr val="accent2"/>
+            </a:effectRef>
+            <a:fontRef idx="minor">
+              <a:schemeClr val="tx1"/>
+            </a:fontRef>
+          </p:style>
+        </p:cxnSp>
+        <p:cxnSp>
+          <p:nvCxnSpPr>
+            <p:cNvPr id="27" name="Straight Arrow Connector 26"/>
+            <p:cNvCxnSpPr/>
+            <p:nvPr/>
+          </p:nvCxnSpPr>
+          <p:spPr>
+            <a:xfrm>
+              <a:off x="4797425" y="4301481"/>
+              <a:ext cx="282575" cy="334145"/>
+            </a:xfrm>
+            <a:prstGeom prst="straightConnector1">
+              <a:avLst/>
+            </a:prstGeom>
+            <a:ln>
+              <a:headEnd type="arrow"/>
+              <a:tailEnd type="arrow"/>
+            </a:ln>
+          </p:spPr>
+          <p:style>
+            <a:lnRef idx="2">
+              <a:schemeClr val="accent2"/>
+            </a:lnRef>
+            <a:fillRef idx="0">
+              <a:schemeClr val="accent2"/>
+            </a:fillRef>
+            <a:effectRef idx="1">
+              <a:schemeClr val="accent2"/>
+            </a:effectRef>
+            <a:fontRef idx="minor">
+              <a:schemeClr val="tx1"/>
+            </a:fontRef>
+          </p:style>
+        </p:cxnSp>
+        <p:cxnSp>
+          <p:nvCxnSpPr>
+            <p:cNvPr id="28" name="Straight Arrow Connector 27"/>
+            <p:cNvCxnSpPr/>
+            <p:nvPr/>
+          </p:nvCxnSpPr>
+          <p:spPr>
+            <a:xfrm flipH="1">
+              <a:off x="2799199" y="4301481"/>
+              <a:ext cx="419049" cy="528480"/>
+            </a:xfrm>
+            <a:prstGeom prst="straightConnector1">
+              <a:avLst/>
+            </a:prstGeom>
+            <a:ln>
+              <a:headEnd type="arrow"/>
+              <a:tailEnd type="arrow"/>
+            </a:ln>
+          </p:spPr>
+          <p:style>
+            <a:lnRef idx="2">
+              <a:schemeClr val="accent2"/>
+            </a:lnRef>
+            <a:fillRef idx="0">
+              <a:schemeClr val="accent2"/>
+            </a:fillRef>
+            <a:effectRef idx="1">
+              <a:schemeClr val="accent2"/>
+            </a:effectRef>
+            <a:fontRef idx="minor">
+              <a:schemeClr val="tx1"/>
+            </a:fontRef>
+          </p:style>
+        </p:cxnSp>
+        <p:cxnSp>
+          <p:nvCxnSpPr>
+            <p:cNvPr id="29" name="Straight Arrow Connector 28"/>
+            <p:cNvCxnSpPr/>
+            <p:nvPr/>
+          </p:nvCxnSpPr>
+          <p:spPr>
+            <a:xfrm>
+              <a:off x="5866808" y="4301481"/>
+              <a:ext cx="329205" cy="410209"/>
+            </a:xfrm>
+            <a:prstGeom prst="straightConnector1">
+              <a:avLst/>
+            </a:prstGeom>
+            <a:ln>
+              <a:headEnd type="arrow"/>
+              <a:tailEnd type="arrow"/>
+            </a:ln>
+          </p:spPr>
+          <p:style>
+            <a:lnRef idx="2">
+              <a:schemeClr val="accent2"/>
+            </a:lnRef>
+            <a:fillRef idx="0">
+              <a:schemeClr val="accent2"/>
+            </a:fillRef>
+            <a:effectRef idx="1">
+              <a:schemeClr val="accent2"/>
+            </a:effectRef>
+            <a:fontRef idx="minor">
+              <a:schemeClr val="tx1"/>
+            </a:fontRef>
+          </p:style>
+        </p:cxnSp>
+        <p:cxnSp>
+          <p:nvCxnSpPr>
+            <p:cNvPr id="30" name="Straight Arrow Connector 29"/>
+            <p:cNvCxnSpPr/>
+            <p:nvPr/>
+          </p:nvCxnSpPr>
+          <p:spPr>
+            <a:xfrm>
+              <a:off x="1332792" y="2790685"/>
+              <a:ext cx="607442" cy="803458"/>
+            </a:xfrm>
+            <a:prstGeom prst="straightConnector1">
+              <a:avLst/>
+            </a:prstGeom>
+            <a:ln>
+              <a:tailEnd type="arrow"/>
+            </a:ln>
+          </p:spPr>
+          <p:style>
+            <a:lnRef idx="2">
+              <a:schemeClr val="accent1"/>
+            </a:lnRef>
+            <a:fillRef idx="0">
+              <a:schemeClr val="accent1"/>
+            </a:fillRef>
+            <a:effectRef idx="1">
+              <a:schemeClr val="accent1"/>
+            </a:effectRef>
+            <a:fontRef idx="minor">
+              <a:schemeClr val="tx1"/>
+            </a:fontRef>
+          </p:style>
+        </p:cxnSp>
+        <p:cxnSp>
+          <p:nvCxnSpPr>
+            <p:cNvPr id="31" name="Straight Arrow Connector 30"/>
+            <p:cNvCxnSpPr/>
+            <p:nvPr/>
+          </p:nvCxnSpPr>
+          <p:spPr>
+            <a:xfrm flipV="1">
+              <a:off x="2321791" y="2790685"/>
+              <a:ext cx="233737" cy="728879"/>
+            </a:xfrm>
+            <a:prstGeom prst="straightConnector1">
+              <a:avLst/>
+            </a:prstGeom>
+            <a:ln>
+              <a:tailEnd type="arrow"/>
+            </a:ln>
+          </p:spPr>
+          <p:style>
+            <a:lnRef idx="2">
+              <a:schemeClr val="accent1"/>
+            </a:lnRef>
+            <a:fillRef idx="0">
+              <a:schemeClr val="accent1"/>
+            </a:fillRef>
+            <a:effectRef idx="1">
+              <a:schemeClr val="accent1"/>
+            </a:effectRef>
+            <a:fontRef idx="minor">
+              <a:schemeClr val="tx1"/>
+            </a:fontRef>
+          </p:style>
+        </p:cxnSp>
+        <p:sp>
+          <p:nvSpPr>
+            <p:cNvPr id="32" name="Diamond 31"/>
+            <p:cNvSpPr/>
+            <p:nvPr/>
+          </p:nvSpPr>
+          <p:spPr>
+            <a:xfrm>
+              <a:off x="2249754" y="2188314"/>
+              <a:ext cx="757238" cy="523875"/>
+            </a:xfrm>
+            <a:prstGeom prst="diamond">
+              <a:avLst/>
+            </a:prstGeom>
+          </p:spPr>
+          <p:style>
+            <a:lnRef idx="1">
+              <a:schemeClr val="accent1"/>
+            </a:lnRef>
+            <a:fillRef idx="3">
+              <a:schemeClr val="accent1"/>
+            </a:fillRef>
+            <a:effectRef idx="2">
+              <a:schemeClr val="accent1"/>
+            </a:effectRef>
+            <a:fontRef idx="minor">
+              <a:schemeClr val="lt1"/>
+            </a:fontRef>
+          </p:style>
+          <p:txBody>
+            <a:bodyPr anchor="ctr"/>
+            <a:lstStyle/>
+            <a:p>
+              <a:pPr algn="ctr" fontAlgn="auto">
+                <a:spcBef>
+                  <a:spcPts val="0"/>
+                </a:spcBef>
+                <a:spcAft>
+                  <a:spcPts val="0"/>
+                </a:spcAft>
+                <a:defRPr/>
+              </a:pPr>
+              <a:endParaRPr lang="en-US"/>
+            </a:p>
+          </p:txBody>
+        </p:sp>
+        <p:cxnSp>
+          <p:nvCxnSpPr>
+            <p:cNvPr id="33" name="Straight Arrow Connector 32"/>
+            <p:cNvCxnSpPr/>
+            <p:nvPr/>
+          </p:nvCxnSpPr>
+          <p:spPr>
+            <a:xfrm>
+              <a:off x="2799199" y="2675751"/>
+              <a:ext cx="486925" cy="783439"/>
+            </a:xfrm>
+            <a:prstGeom prst="straightConnector1">
+              <a:avLst/>
+            </a:prstGeom>
+            <a:ln>
+              <a:tailEnd type="arrow"/>
+            </a:ln>
+          </p:spPr>
+          <p:style>
+            <a:lnRef idx="2">
+              <a:schemeClr val="accent1"/>
+            </a:lnRef>
+            <a:fillRef idx="0">
+              <a:schemeClr val="accent1"/>
+            </a:fillRef>
+            <a:effectRef idx="1">
+              <a:schemeClr val="accent1"/>
+            </a:effectRef>
+            <a:fontRef idx="minor">
+              <a:schemeClr val="tx1"/>
+            </a:fontRef>
+          </p:style>
+        </p:cxnSp>
+        <p:cxnSp>
+          <p:nvCxnSpPr>
+            <p:cNvPr id="34" name="Straight Arrow Connector 33"/>
+            <p:cNvCxnSpPr/>
+            <p:nvPr/>
+          </p:nvCxnSpPr>
+          <p:spPr>
+            <a:xfrm>
+              <a:off x="1462088" y="2712189"/>
+              <a:ext cx="1470026" cy="881953"/>
+            </a:xfrm>
+            <a:prstGeom prst="straightConnector1">
+              <a:avLst/>
+            </a:prstGeom>
+            <a:ln>
+              <a:tailEnd type="arrow"/>
+            </a:ln>
+          </p:spPr>
+          <p:style>
+            <a:lnRef idx="2">
+              <a:schemeClr val="accent1"/>
+            </a:lnRef>
+            <a:fillRef idx="0">
+              <a:schemeClr val="accent1"/>
+            </a:fillRef>
+            <a:effectRef idx="1">
+              <a:schemeClr val="accent1"/>
+            </a:effectRef>
+            <a:fontRef idx="minor">
+              <a:schemeClr val="tx1"/>
+            </a:fontRef>
+          </p:style>
+        </p:cxnSp>
+        <p:sp>
+          <p:nvSpPr>
+            <p:cNvPr id="35" name="Diamond 34"/>
+            <p:cNvSpPr/>
+            <p:nvPr/>
+          </p:nvSpPr>
+          <p:spPr>
+            <a:xfrm>
+              <a:off x="3735897" y="2190978"/>
+              <a:ext cx="781050" cy="515937"/>
+            </a:xfrm>
+            <a:prstGeom prst="diamond">
+              <a:avLst/>
+            </a:prstGeom>
+          </p:spPr>
+          <p:style>
+            <a:lnRef idx="1">
+              <a:schemeClr val="accent1"/>
+            </a:lnRef>
+            <a:fillRef idx="3">
+              <a:schemeClr val="accent1"/>
+            </a:fillRef>
+            <a:effectRef idx="2">
+              <a:schemeClr val="accent1"/>
+            </a:effectRef>
+            <a:fontRef idx="minor">
+              <a:schemeClr val="lt1"/>
+            </a:fontRef>
+          </p:style>
+          <p:txBody>
+            <a:bodyPr anchor="ctr"/>
+            <a:lstStyle/>
+            <a:p>
+              <a:pPr algn="ctr" fontAlgn="auto">
+                <a:spcBef>
+                  <a:spcPts val="0"/>
+                </a:spcBef>
+                <a:spcAft>
+                  <a:spcPts val="0"/>
+                </a:spcAft>
+                <a:defRPr/>
+              </a:pPr>
+              <a:endParaRPr lang="en-US"/>
+            </a:p>
+          </p:txBody>
+        </p:sp>
+        <p:cxnSp>
+          <p:nvCxnSpPr>
+            <p:cNvPr id="37" name="Straight Arrow Connector 36"/>
+            <p:cNvCxnSpPr/>
+            <p:nvPr/>
+          </p:nvCxnSpPr>
+          <p:spPr>
+            <a:xfrm flipV="1">
+              <a:off x="4797425" y="2675751"/>
+              <a:ext cx="612775" cy="850314"/>
+            </a:xfrm>
+            <a:prstGeom prst="straightConnector1">
+              <a:avLst/>
+            </a:prstGeom>
+            <a:ln>
+              <a:tailEnd type="arrow"/>
+            </a:ln>
+          </p:spPr>
+          <p:style>
+            <a:lnRef idx="2">
+              <a:schemeClr val="accent1"/>
+            </a:lnRef>
+            <a:fillRef idx="0">
+              <a:schemeClr val="accent1"/>
+            </a:fillRef>
+            <a:effectRef idx="1">
+              <a:schemeClr val="accent1"/>
+            </a:effectRef>
+            <a:fontRef idx="minor">
+              <a:schemeClr val="tx1"/>
+            </a:fontRef>
+          </p:style>
+        </p:cxnSp>
+        <p:cxnSp>
+          <p:nvCxnSpPr>
+            <p:cNvPr id="38" name="Straight Arrow Connector 37"/>
+            <p:cNvCxnSpPr/>
+            <p:nvPr/>
+          </p:nvCxnSpPr>
+          <p:spPr>
+            <a:xfrm flipV="1">
+              <a:off x="7222484" y="2697193"/>
+              <a:ext cx="1012862" cy="845875"/>
+            </a:xfrm>
+            <a:prstGeom prst="straightConnector1">
+              <a:avLst/>
+            </a:prstGeom>
+            <a:ln>
+              <a:tailEnd type="arrow"/>
+            </a:ln>
+          </p:spPr>
+          <p:style>
+            <a:lnRef idx="2">
+              <a:schemeClr val="accent1"/>
+            </a:lnRef>
+            <a:fillRef idx="0">
+              <a:schemeClr val="accent1"/>
+            </a:fillRef>
+            <a:effectRef idx="1">
+              <a:schemeClr val="accent1"/>
+            </a:effectRef>
+            <a:fontRef idx="minor">
+              <a:schemeClr val="tx1"/>
+            </a:fontRef>
+          </p:style>
+        </p:cxnSp>
+        <p:sp>
+          <p:nvSpPr>
+            <p:cNvPr id="39" name="Diamond 38"/>
+            <p:cNvSpPr/>
+            <p:nvPr/>
+          </p:nvSpPr>
+          <p:spPr>
+            <a:xfrm>
+              <a:off x="8034924" y="2180816"/>
+              <a:ext cx="725487" cy="517525"/>
+            </a:xfrm>
+            <a:prstGeom prst="diamond">
+              <a:avLst/>
+            </a:prstGeom>
+          </p:spPr>
+          <p:style>
+            <a:lnRef idx="1">
+              <a:schemeClr val="accent1"/>
+            </a:lnRef>
+            <a:fillRef idx="3">
+              <a:schemeClr val="accent1"/>
+            </a:fillRef>
+            <a:effectRef idx="2">
+              <a:schemeClr val="accent1"/>
+            </a:effectRef>
+            <a:fontRef idx="minor">
+              <a:schemeClr val="lt1"/>
+            </a:fontRef>
+          </p:style>
+          <p:txBody>
+            <a:bodyPr anchor="ctr"/>
+            <a:lstStyle/>
+            <a:p>
+              <a:pPr algn="ctr" fontAlgn="auto">
+                <a:spcBef>
+                  <a:spcPts val="0"/>
+                </a:spcBef>
+                <a:spcAft>
+                  <a:spcPts val="0"/>
+                </a:spcAft>
+                <a:defRPr/>
+              </a:pPr>
+              <a:endParaRPr lang="en-US"/>
+            </a:p>
+          </p:txBody>
+        </p:sp>
+        <p:sp>
+          <p:nvSpPr>
+            <p:cNvPr id="41" name="Oval 40"/>
+            <p:cNvSpPr>
+              <a:spLocks noChangeAspect="1"/>
+            </p:cNvSpPr>
+            <p:nvPr/>
+          </p:nvSpPr>
+          <p:spPr>
+            <a:xfrm>
+              <a:off x="5314127" y="3519564"/>
+              <a:ext cx="939589" cy="735171"/>
+            </a:xfrm>
+            <a:prstGeom prst="ellipse">
+              <a:avLst/>
+            </a:prstGeom>
+            <a:effectLst>
+              <a:outerShdw blurRad="180975" dist="114300" dir="9360000" sx="96000" sy="96000" algn="tl" rotWithShape="0">
+                <a:srgbClr val="000000">
+                  <a:alpha val="35000"/>
+                </a:srgbClr>
+              </a:outerShdw>
+            </a:effectLst>
+          </p:spPr>
+          <p:style>
+            <a:lnRef idx="1">
+              <a:schemeClr val="accent1"/>
+            </a:lnRef>
+            <a:fillRef idx="3">
+              <a:schemeClr val="accent1"/>
+            </a:fillRef>
+            <a:effectRef idx="2">
+              <a:schemeClr val="accent1"/>
+            </a:effectRef>
+            <a:fontRef idx="minor">
+              <a:schemeClr val="lt1"/>
+            </a:fontRef>
+          </p:style>
+          <p:txBody>
+            <a:bodyPr anchor="ctr"/>
+            <a:lstStyle/>
+            <a:p>
+              <a:pPr algn="ctr" fontAlgn="auto">
+                <a:spcBef>
+                  <a:spcPts val="0"/>
+                </a:spcBef>
+                <a:spcAft>
+                  <a:spcPts val="0"/>
+                </a:spcAft>
+                <a:defRPr/>
+              </a:pPr>
+              <a:r>
+                <a:rPr lang="en-US" sz="1050" dirty="0" smtClean="0"/>
+                <a:t>Analyze</a:t>
+              </a:r>
+              <a:endParaRPr lang="en-US" sz="1050" dirty="0"/>
+            </a:p>
+          </p:txBody>
+        </p:sp>
+        <p:cxnSp>
+          <p:nvCxnSpPr>
+            <p:cNvPr id="42" name="Straight Arrow Connector 41"/>
+            <p:cNvCxnSpPr>
+              <a:endCxn id="14" idx="0"/>
+            </p:cNvCxnSpPr>
+            <p:nvPr/>
+          </p:nvCxnSpPr>
+          <p:spPr>
+            <a:xfrm flipH="1">
+              <a:off x="3928208" y="4301481"/>
+              <a:ext cx="333603" cy="391879"/>
+            </a:xfrm>
+            <a:prstGeom prst="straightConnector1">
+              <a:avLst/>
+            </a:prstGeom>
+            <a:ln>
+              <a:headEnd type="arrow"/>
+              <a:tailEnd type="arrow"/>
+            </a:ln>
+          </p:spPr>
+          <p:style>
+            <a:lnRef idx="2">
+              <a:schemeClr val="accent2"/>
+            </a:lnRef>
+            <a:fillRef idx="0">
+              <a:schemeClr val="accent2"/>
+            </a:fillRef>
+            <a:effectRef idx="1">
+              <a:schemeClr val="accent2"/>
+            </a:effectRef>
+            <a:fontRef idx="minor">
+              <a:schemeClr val="tx1"/>
+            </a:fontRef>
+          </p:style>
+        </p:cxnSp>
+        <p:sp>
+          <p:nvSpPr>
+            <p:cNvPr id="43" name="TextBox 42"/>
+            <p:cNvSpPr txBox="1"/>
+            <p:nvPr/>
+          </p:nvSpPr>
+          <p:spPr>
+            <a:xfrm>
+              <a:off x="924362" y="4812973"/>
+              <a:ext cx="1467068" cy="830997"/>
+            </a:xfrm>
+            <a:prstGeom prst="rect">
+              <a:avLst/>
+            </a:prstGeom>
+            <a:noFill/>
+          </p:spPr>
+          <p:txBody>
+            <a:bodyPr wrap="none">
+              <a:spAutoFit/>
+            </a:bodyPr>
+            <a:lstStyle/>
+            <a:p>
+              <a:pPr fontAlgn="auto">
+                <a:spcBef>
+                  <a:spcPts val="0"/>
+                </a:spcBef>
+                <a:spcAft>
+                  <a:spcPts val="0"/>
+                </a:spcAft>
+                <a:defRPr/>
+              </a:pPr>
+              <a:r>
+                <a:rPr lang="en-US" sz="1200" dirty="0">
+                  <a:solidFill>
+                    <a:schemeClr val="accent6">
+                      <a:lumMod val="50000"/>
+                    </a:schemeClr>
+                  </a:solidFill>
+                  <a:latin typeface="+mn-lt"/>
+                  <a:ea typeface="+mn-ea"/>
+                  <a:cs typeface="+mn-cs"/>
+                </a:rPr>
+                <a:t>flexible mapping to</a:t>
+              </a:r>
+            </a:p>
+            <a:p>
+              <a:pPr fontAlgn="auto">
+                <a:spcBef>
+                  <a:spcPts val="0"/>
+                </a:spcBef>
+                <a:spcAft>
+                  <a:spcPts val="0"/>
+                </a:spcAft>
+                <a:defRPr/>
+              </a:pPr>
+              <a:r>
+                <a:rPr lang="en-US" sz="1200" dirty="0">
+                  <a:solidFill>
+                    <a:schemeClr val="accent6">
+                      <a:lumMod val="50000"/>
+                    </a:schemeClr>
+                  </a:solidFill>
+                  <a:latin typeface="+mn-lt"/>
+                  <a:ea typeface="+mn-ea"/>
+                  <a:cs typeface="+mn-cs"/>
+                </a:rPr>
+                <a:t>a network of </a:t>
+              </a:r>
+              <a:r>
+                <a:rPr lang="en-US" sz="1200" dirty="0" smtClean="0">
+                  <a:solidFill>
+                    <a:schemeClr val="accent6">
+                      <a:lumMod val="50000"/>
+                    </a:schemeClr>
+                  </a:solidFill>
+                  <a:latin typeface="+mn-lt"/>
+                  <a:ea typeface="+mn-ea"/>
+                  <a:cs typeface="+mn-cs"/>
+                </a:rPr>
+                <a:t>servers</a:t>
+              </a:r>
+            </a:p>
+            <a:p>
+              <a:pPr fontAlgn="auto">
+                <a:spcBef>
+                  <a:spcPts val="0"/>
+                </a:spcBef>
+                <a:spcAft>
+                  <a:spcPts val="0"/>
+                </a:spcAft>
+                <a:defRPr/>
+              </a:pPr>
+              <a:r>
+                <a:rPr lang="en-US" sz="1200" dirty="0" smtClean="0">
+                  <a:solidFill>
+                    <a:schemeClr val="accent6">
+                      <a:lumMod val="50000"/>
+                    </a:schemeClr>
+                  </a:solidFill>
+                </a:rPr>
+                <a:t>through REST and</a:t>
+              </a:r>
+            </a:p>
+            <a:p>
+              <a:pPr fontAlgn="auto">
+                <a:spcBef>
+                  <a:spcPts val="0"/>
+                </a:spcBef>
+                <a:spcAft>
+                  <a:spcPts val="0"/>
+                </a:spcAft>
+                <a:defRPr/>
+              </a:pPr>
+              <a:r>
+                <a:rPr lang="en-US" sz="1200" dirty="0" smtClean="0">
+                  <a:solidFill>
+                    <a:schemeClr val="accent6">
+                      <a:lumMod val="50000"/>
+                    </a:schemeClr>
+                  </a:solidFill>
+                  <a:latin typeface="+mn-lt"/>
+                  <a:ea typeface="+mn-ea"/>
+                  <a:cs typeface="+mn-cs"/>
+                </a:rPr>
+                <a:t>virtualization</a:t>
+              </a:r>
+              <a:endParaRPr lang="en-US" sz="1200" dirty="0">
+                <a:solidFill>
+                  <a:schemeClr val="accent6">
+                    <a:lumMod val="50000"/>
+                  </a:schemeClr>
+                </a:solidFill>
+                <a:latin typeface="+mn-lt"/>
+                <a:ea typeface="+mn-ea"/>
+                <a:cs typeface="+mn-cs"/>
+              </a:endParaRPr>
+            </a:p>
+          </p:txBody>
+        </p:sp>
+        <p:cxnSp>
+          <p:nvCxnSpPr>
+            <p:cNvPr id="47" name="Straight Arrow Connector 46"/>
+            <p:cNvCxnSpPr/>
+            <p:nvPr/>
+          </p:nvCxnSpPr>
+          <p:spPr>
+            <a:xfrm rot="5400000">
+              <a:off x="3052762" y="905689"/>
+              <a:ext cx="468313" cy="1588"/>
+            </a:xfrm>
+            <a:prstGeom prst="straightConnector1">
+              <a:avLst/>
+            </a:prstGeom>
+            <a:ln>
+              <a:headEnd type="arrow"/>
+              <a:tailEnd type="arrow"/>
+            </a:ln>
+          </p:spPr>
+          <p:style>
+            <a:lnRef idx="3">
+              <a:schemeClr val="accent4"/>
+            </a:lnRef>
+            <a:fillRef idx="0">
+              <a:schemeClr val="accent4"/>
+            </a:fillRef>
+            <a:effectRef idx="2">
+              <a:schemeClr val="accent4"/>
+            </a:effectRef>
+            <a:fontRef idx="minor">
+              <a:schemeClr val="tx1"/>
+            </a:fontRef>
+          </p:style>
+        </p:cxnSp>
+        <p:sp>
+          <p:nvSpPr>
+            <p:cNvPr id="48" name="Right Arrow 47"/>
+            <p:cNvSpPr/>
+            <p:nvPr/>
+          </p:nvSpPr>
+          <p:spPr>
+            <a:xfrm>
+              <a:off x="1764299" y="2310698"/>
+              <a:ext cx="387181" cy="217488"/>
+            </a:xfrm>
+            <a:prstGeom prst="rightArrow">
+              <a:avLst/>
+            </a:prstGeom>
+          </p:spPr>
+          <p:style>
+            <a:lnRef idx="1">
+              <a:schemeClr val="accent3"/>
+            </a:lnRef>
+            <a:fillRef idx="3">
+              <a:schemeClr val="accent3"/>
+            </a:fillRef>
+            <a:effectRef idx="2">
+              <a:schemeClr val="accent3"/>
+            </a:effectRef>
+            <a:fontRef idx="minor">
+              <a:schemeClr val="lt1"/>
+            </a:fontRef>
+          </p:style>
+          <p:txBody>
+            <a:bodyPr anchor="ctr"/>
+            <a:lstStyle/>
+            <a:p>
+              <a:pPr algn="ctr" fontAlgn="auto">
+                <a:spcBef>
+                  <a:spcPts val="0"/>
+                </a:spcBef>
+                <a:spcAft>
+                  <a:spcPts val="0"/>
+                </a:spcAft>
+                <a:defRPr/>
+              </a:pPr>
+              <a:endParaRPr lang="en-US">
+                <a:solidFill>
+                  <a:srgbClr val="008000"/>
+                </a:solidFill>
+              </a:endParaRPr>
+            </a:p>
+          </p:txBody>
+        </p:sp>
+        <p:sp>
+          <p:nvSpPr>
+            <p:cNvPr id="49" name="TextBox 86"/>
+            <p:cNvSpPr txBox="1">
+              <a:spLocks noChangeArrowheads="1"/>
+            </p:cNvSpPr>
+            <p:nvPr/>
+          </p:nvSpPr>
+          <p:spPr bwMode="auto">
+            <a:xfrm>
+              <a:off x="841445" y="2245416"/>
+              <a:ext cx="810778" cy="400110"/>
+            </a:xfrm>
+            <a:prstGeom prst="rect">
+              <a:avLst/>
+            </a:prstGeom>
+            <a:noFill/>
+            <a:ln w="9525">
+              <a:noFill/>
+              <a:miter lim="800000"/>
+              <a:headEnd/>
+              <a:tailEnd/>
+            </a:ln>
+          </p:spPr>
+          <p:txBody>
+            <a:bodyPr wrap="square">
+              <a:prstTxWarp prst="textNoShape">
+                <a:avLst/>
+              </a:prstTxWarp>
+              <a:spAutoFit/>
+            </a:bodyPr>
+            <a:lstStyle/>
+            <a:p>
+              <a:r>
+                <a:rPr lang="en-US" sz="1000" dirty="0" smtClean="0">
+                  <a:latin typeface="Calibri" pitchFamily="-106" charset="0"/>
+                </a:rPr>
+                <a:t>S</a:t>
+              </a:r>
+              <a:r>
+                <a:rPr lang="en-US" sz="1000" dirty="0" smtClean="0">
+                  <a:latin typeface="Calibri" pitchFamily="-106" charset="0"/>
+                </a:rPr>
+                <a:t>pace time</a:t>
+              </a:r>
+            </a:p>
+            <a:p>
+              <a:pPr algn="ctr"/>
+              <a:r>
+                <a:rPr lang="en-US" sz="1000" dirty="0" smtClean="0">
+                  <a:latin typeface="Calibri" pitchFamily="-106" charset="0"/>
+                </a:rPr>
+                <a:t>query</a:t>
+              </a:r>
+              <a:endParaRPr lang="en-US" sz="1000" dirty="0" smtClean="0">
+                <a:latin typeface="Calibri" pitchFamily="-106" charset="0"/>
+              </a:endParaRPr>
+            </a:p>
+          </p:txBody>
+        </p:sp>
+        <p:sp>
+          <p:nvSpPr>
+            <p:cNvPr id="50" name="TextBox 90"/>
+            <p:cNvSpPr txBox="1">
+              <a:spLocks noChangeArrowheads="1"/>
+            </p:cNvSpPr>
+            <p:nvPr/>
+          </p:nvSpPr>
+          <p:spPr bwMode="auto">
+            <a:xfrm>
+              <a:off x="2330990" y="2253594"/>
+              <a:ext cx="586293" cy="400110"/>
+            </a:xfrm>
+            <a:prstGeom prst="rect">
+              <a:avLst/>
+            </a:prstGeom>
+            <a:noFill/>
+            <a:ln w="9525">
+              <a:noFill/>
+              <a:miter lim="800000"/>
+              <a:headEnd/>
+              <a:tailEnd/>
+            </a:ln>
+          </p:spPr>
+          <p:txBody>
+            <a:bodyPr wrap="none">
+              <a:prstTxWarp prst="textNoShape">
+                <a:avLst/>
+              </a:prstTxWarp>
+              <a:spAutoFit/>
+            </a:bodyPr>
+            <a:lstStyle/>
+            <a:p>
+              <a:pPr algn="ctr"/>
+              <a:r>
+                <a:rPr lang="en-US" sz="1000" dirty="0">
+                  <a:latin typeface="Calibri" pitchFamily="-106" charset="0"/>
+                </a:rPr>
+                <a:t>D</a:t>
+              </a:r>
+              <a:r>
+                <a:rPr lang="en-US" sz="1000" dirty="0" smtClean="0">
+                  <a:latin typeface="Calibri" pitchFamily="-106" charset="0"/>
+                </a:rPr>
+                <a:t>ataset</a:t>
+              </a:r>
+              <a:endParaRPr lang="en-US" sz="1000" dirty="0" smtClean="0">
+                <a:latin typeface="Calibri" pitchFamily="-106" charset="0"/>
+              </a:endParaRPr>
+            </a:p>
+            <a:p>
+              <a:pPr algn="ctr"/>
+              <a:r>
+                <a:rPr lang="en-US" sz="1000" dirty="0" smtClean="0">
+                  <a:latin typeface="Calibri" pitchFamily="-106" charset="0"/>
+                </a:rPr>
+                <a:t>files</a:t>
+              </a:r>
+              <a:endParaRPr lang="en-US" sz="1000" dirty="0">
+                <a:latin typeface="Calibri" pitchFamily="-106" charset="0"/>
+              </a:endParaRPr>
+            </a:p>
+          </p:txBody>
+        </p:sp>
+        <p:sp>
+          <p:nvSpPr>
+            <p:cNvPr id="51" name="Right Arrow 50"/>
+            <p:cNvSpPr/>
+            <p:nvPr/>
+          </p:nvSpPr>
+          <p:spPr>
+            <a:xfrm>
+              <a:off x="3169504" y="2317147"/>
+              <a:ext cx="422261" cy="217487"/>
+            </a:xfrm>
+            <a:prstGeom prst="rightArrow">
+              <a:avLst/>
+            </a:prstGeom>
+          </p:spPr>
+          <p:style>
+            <a:lnRef idx="1">
+              <a:schemeClr val="accent3"/>
+            </a:lnRef>
+            <a:fillRef idx="3">
+              <a:schemeClr val="accent3"/>
+            </a:fillRef>
+            <a:effectRef idx="2">
+              <a:schemeClr val="accent3"/>
+            </a:effectRef>
+            <a:fontRef idx="minor">
+              <a:schemeClr val="lt1"/>
+            </a:fontRef>
+          </p:style>
+          <p:txBody>
+            <a:bodyPr anchor="ctr"/>
+            <a:lstStyle/>
+            <a:p>
+              <a:pPr algn="ctr" fontAlgn="auto">
+                <a:spcBef>
+                  <a:spcPts val="0"/>
+                </a:spcBef>
+                <a:spcAft>
+                  <a:spcPts val="0"/>
+                </a:spcAft>
+                <a:defRPr/>
+              </a:pPr>
+              <a:endParaRPr lang="en-US">
+                <a:solidFill>
+                  <a:srgbClr val="008000"/>
+                </a:solidFill>
+              </a:endParaRPr>
+            </a:p>
+          </p:txBody>
+        </p:sp>
+        <p:sp>
+          <p:nvSpPr>
+            <p:cNvPr id="52" name="Right Arrow 51"/>
+            <p:cNvSpPr/>
+            <p:nvPr/>
+          </p:nvSpPr>
+          <p:spPr>
+            <a:xfrm>
+              <a:off x="6099174" y="2320944"/>
+              <a:ext cx="420905" cy="215900"/>
+            </a:xfrm>
+            <a:prstGeom prst="rightArrow">
+              <a:avLst/>
+            </a:prstGeom>
+          </p:spPr>
+          <p:style>
+            <a:lnRef idx="1">
+              <a:schemeClr val="accent3"/>
+            </a:lnRef>
+            <a:fillRef idx="3">
+              <a:schemeClr val="accent3"/>
+            </a:fillRef>
+            <a:effectRef idx="2">
+              <a:schemeClr val="accent3"/>
+            </a:effectRef>
+            <a:fontRef idx="minor">
+              <a:schemeClr val="lt1"/>
+            </a:fontRef>
+          </p:style>
+          <p:txBody>
+            <a:bodyPr anchor="ctr"/>
+            <a:lstStyle/>
+            <a:p>
+              <a:pPr algn="ctr" fontAlgn="auto">
+                <a:spcBef>
+                  <a:spcPts val="0"/>
+                </a:spcBef>
+                <a:spcAft>
+                  <a:spcPts val="0"/>
+                </a:spcAft>
+                <a:defRPr/>
+              </a:pPr>
+              <a:endParaRPr lang="en-US">
+                <a:solidFill>
+                  <a:srgbClr val="008000"/>
+                </a:solidFill>
+              </a:endParaRPr>
+            </a:p>
+          </p:txBody>
+        </p:sp>
+        <p:sp>
+          <p:nvSpPr>
+            <p:cNvPr id="54" name="TextBox 106"/>
+            <p:cNvSpPr txBox="1">
+              <a:spLocks noChangeArrowheads="1"/>
+            </p:cNvSpPr>
+            <p:nvPr/>
+          </p:nvSpPr>
+          <p:spPr bwMode="auto">
+            <a:xfrm>
+              <a:off x="8127187" y="2290623"/>
+              <a:ext cx="555173" cy="246221"/>
+            </a:xfrm>
+            <a:prstGeom prst="rect">
+              <a:avLst/>
+            </a:prstGeom>
+            <a:noFill/>
+            <a:ln w="9525">
+              <a:noFill/>
+              <a:miter lim="800000"/>
+              <a:headEnd/>
+              <a:tailEnd/>
+            </a:ln>
+          </p:spPr>
+          <p:txBody>
+            <a:bodyPr wrap="none">
+              <a:prstTxWarp prst="textNoShape">
+                <a:avLst/>
+              </a:prstTxWarp>
+              <a:spAutoFit/>
+            </a:bodyPr>
+            <a:lstStyle/>
+            <a:p>
+              <a:pPr algn="ctr"/>
+              <a:r>
+                <a:rPr lang="en-US" sz="1000" dirty="0" smtClean="0">
+                  <a:latin typeface="Calibri" pitchFamily="-106" charset="0"/>
+                </a:rPr>
+                <a:t>I</a:t>
+              </a:r>
+              <a:r>
+                <a:rPr lang="en-US" sz="1000" dirty="0" smtClean="0">
+                  <a:latin typeface="Calibri" pitchFamily="-106" charset="0"/>
+                </a:rPr>
+                <a:t>mages</a:t>
+              </a:r>
+              <a:endParaRPr lang="en-US" sz="1000" dirty="0">
+                <a:latin typeface="Calibri" pitchFamily="-106" charset="0"/>
+              </a:endParaRPr>
+            </a:p>
+          </p:txBody>
+        </p:sp>
+        <p:sp>
+          <p:nvSpPr>
+            <p:cNvPr id="55" name="TextBox 15"/>
+            <p:cNvSpPr txBox="1">
+              <a:spLocks noChangeArrowheads="1"/>
+            </p:cNvSpPr>
+            <p:nvPr/>
+          </p:nvSpPr>
+          <p:spPr bwMode="auto">
+            <a:xfrm>
+              <a:off x="3560044" y="3156177"/>
+              <a:ext cx="946030" cy="369332"/>
+            </a:xfrm>
+            <a:prstGeom prst="rect">
+              <a:avLst/>
+            </a:prstGeom>
+            <a:noFill/>
+            <a:ln w="9525">
+              <a:noFill/>
+              <a:miter lim="800000"/>
+              <a:headEnd/>
+              <a:tailEnd/>
+            </a:ln>
+          </p:spPr>
+          <p:txBody>
+            <a:bodyPr wrap="none">
+              <a:prstTxWarp prst="textNoShape">
+                <a:avLst/>
+              </a:prstTxWarp>
+              <a:spAutoFit/>
+            </a:bodyPr>
+            <a:lstStyle/>
+            <a:p>
+              <a:r>
+                <a:rPr lang="en-US" dirty="0">
+                  <a:latin typeface="Calibri" pitchFamily="-106" charset="0"/>
+                </a:rPr>
+                <a:t>S</a:t>
+              </a:r>
+              <a:r>
+                <a:rPr lang="en-US" dirty="0" smtClean="0">
+                  <a:latin typeface="Calibri" pitchFamily="-106" charset="0"/>
+                </a:rPr>
+                <a:t>ervices</a:t>
+              </a:r>
+              <a:endParaRPr lang="en-US" dirty="0">
+                <a:latin typeface="Calibri" pitchFamily="-106" charset="0"/>
+              </a:endParaRPr>
+            </a:p>
+          </p:txBody>
+        </p:sp>
+        <p:sp>
+          <p:nvSpPr>
+            <p:cNvPr id="56" name="TextBox 109"/>
+            <p:cNvSpPr txBox="1">
+              <a:spLocks noChangeArrowheads="1"/>
+            </p:cNvSpPr>
+            <p:nvPr/>
+          </p:nvSpPr>
+          <p:spPr bwMode="auto">
+            <a:xfrm>
+              <a:off x="3869730" y="2238214"/>
+              <a:ext cx="535260" cy="400110"/>
+            </a:xfrm>
+            <a:prstGeom prst="rect">
+              <a:avLst/>
+            </a:prstGeom>
+            <a:noFill/>
+            <a:ln w="9525">
+              <a:noFill/>
+              <a:miter lim="800000"/>
+              <a:headEnd/>
+              <a:tailEnd/>
+            </a:ln>
+          </p:spPr>
+          <p:txBody>
+            <a:bodyPr wrap="none">
+              <a:prstTxWarp prst="textNoShape">
+                <a:avLst/>
+              </a:prstTxWarp>
+              <a:spAutoFit/>
+            </a:bodyPr>
+            <a:lstStyle/>
+            <a:p>
+              <a:pPr algn="ctr"/>
+              <a:r>
+                <a:rPr lang="en-US" sz="1000" dirty="0">
+                  <a:latin typeface="Calibri" pitchFamily="-106" charset="0"/>
+                </a:rPr>
+                <a:t>S</a:t>
+              </a:r>
+              <a:r>
+                <a:rPr lang="en-US" sz="1000" dirty="0" smtClean="0">
+                  <a:latin typeface="Calibri" pitchFamily="-106" charset="0"/>
+                </a:rPr>
+                <a:t>ubset</a:t>
+              </a:r>
+              <a:endParaRPr lang="en-US" sz="1000" dirty="0" smtClean="0">
+                <a:latin typeface="Calibri" pitchFamily="-106" charset="0"/>
+              </a:endParaRPr>
+            </a:p>
+            <a:p>
+              <a:pPr algn="ctr"/>
+              <a:r>
+                <a:rPr lang="en-US" sz="1000" dirty="0" smtClean="0">
+                  <a:latin typeface="Calibri" pitchFamily="-106" charset="0"/>
+                </a:rPr>
+                <a:t>data</a:t>
+              </a:r>
+              <a:endParaRPr lang="en-US" sz="1000" dirty="0">
+                <a:latin typeface="Calibri" pitchFamily="-106" charset="0"/>
+              </a:endParaRPr>
+            </a:p>
+          </p:txBody>
+        </p:sp>
+        <p:sp>
+          <p:nvSpPr>
+            <p:cNvPr id="63" name="Diamond 62"/>
+            <p:cNvSpPr/>
+            <p:nvPr/>
+          </p:nvSpPr>
+          <p:spPr>
+            <a:xfrm>
+              <a:off x="6595844" y="2143353"/>
+              <a:ext cx="781050" cy="515937"/>
+            </a:xfrm>
+            <a:prstGeom prst="diamond">
+              <a:avLst/>
+            </a:prstGeom>
+          </p:spPr>
+          <p:style>
+            <a:lnRef idx="1">
+              <a:schemeClr val="accent1"/>
+            </a:lnRef>
+            <a:fillRef idx="3">
+              <a:schemeClr val="accent1"/>
+            </a:fillRef>
+            <a:effectRef idx="2">
+              <a:schemeClr val="accent1"/>
+            </a:effectRef>
+            <a:fontRef idx="minor">
+              <a:schemeClr val="lt1"/>
+            </a:fontRef>
+          </p:style>
+          <p:txBody>
+            <a:bodyPr anchor="ctr"/>
+            <a:lstStyle/>
+            <a:p>
+              <a:pPr algn="ctr" fontAlgn="auto">
+                <a:spcBef>
+                  <a:spcPts val="0"/>
+                </a:spcBef>
+                <a:spcAft>
+                  <a:spcPts val="0"/>
+                </a:spcAft>
+                <a:defRPr/>
+              </a:pPr>
+              <a:endParaRPr lang="en-US"/>
+            </a:p>
+          </p:txBody>
+        </p:sp>
+        <p:sp>
+          <p:nvSpPr>
+            <p:cNvPr id="64" name="TextBox 128"/>
+            <p:cNvSpPr txBox="1">
+              <a:spLocks noChangeArrowheads="1"/>
+            </p:cNvSpPr>
+            <p:nvPr/>
+          </p:nvSpPr>
+          <p:spPr bwMode="auto">
+            <a:xfrm>
+              <a:off x="6683341" y="2189244"/>
+              <a:ext cx="604891" cy="400110"/>
+            </a:xfrm>
+            <a:prstGeom prst="rect">
+              <a:avLst/>
+            </a:prstGeom>
+            <a:noFill/>
+            <a:ln w="9525">
+              <a:noFill/>
+              <a:miter lim="800000"/>
+              <a:headEnd/>
+              <a:tailEnd/>
+            </a:ln>
+          </p:spPr>
+          <p:txBody>
+            <a:bodyPr wrap="none">
+              <a:prstTxWarp prst="textNoShape">
+                <a:avLst/>
+              </a:prstTxWarp>
+              <a:spAutoFit/>
+            </a:bodyPr>
+            <a:lstStyle/>
+            <a:p>
+              <a:pPr algn="ctr"/>
+              <a:r>
+                <a:rPr lang="en-US" sz="1000" dirty="0" smtClean="0">
+                  <a:latin typeface="Calibri" pitchFamily="-106" charset="0"/>
+                </a:rPr>
+                <a:t>Analysis</a:t>
+              </a:r>
+              <a:endParaRPr lang="en-US" sz="1000" dirty="0" smtClean="0">
+                <a:latin typeface="Calibri" pitchFamily="-106" charset="0"/>
+              </a:endParaRPr>
+            </a:p>
+            <a:p>
+              <a:pPr algn="ctr"/>
+              <a:r>
+                <a:rPr lang="en-US" sz="1000" dirty="0" smtClean="0">
+                  <a:latin typeface="Calibri" pitchFamily="-106" charset="0"/>
+                </a:rPr>
+                <a:t>results</a:t>
+              </a:r>
+              <a:endParaRPr lang="en-US" sz="1000" dirty="0">
+                <a:latin typeface="Calibri" pitchFamily="-106" charset="0"/>
+              </a:endParaRPr>
+            </a:p>
+          </p:txBody>
+        </p:sp>
+        <p:cxnSp>
+          <p:nvCxnSpPr>
+            <p:cNvPr id="66" name="Straight Arrow Connector 65"/>
+            <p:cNvCxnSpPr/>
+            <p:nvPr/>
+          </p:nvCxnSpPr>
+          <p:spPr>
+            <a:xfrm>
+              <a:off x="5660446" y="2714706"/>
+              <a:ext cx="112867" cy="744484"/>
+            </a:xfrm>
+            <a:prstGeom prst="straightConnector1">
+              <a:avLst/>
+            </a:prstGeom>
+            <a:ln>
+              <a:tailEnd type="arrow"/>
+            </a:ln>
+          </p:spPr>
+          <p:style>
+            <a:lnRef idx="2">
+              <a:schemeClr val="accent1"/>
+            </a:lnRef>
+            <a:fillRef idx="0">
+              <a:schemeClr val="accent1"/>
+            </a:fillRef>
+            <a:effectRef idx="1">
+              <a:schemeClr val="accent1"/>
+            </a:effectRef>
+            <a:fontRef idx="minor">
+              <a:schemeClr val="tx1"/>
+            </a:fontRef>
+          </p:style>
+        </p:cxnSp>
+        <p:cxnSp>
+          <p:nvCxnSpPr>
+            <p:cNvPr id="67" name="Straight Arrow Connector 66"/>
+            <p:cNvCxnSpPr/>
+            <p:nvPr/>
+          </p:nvCxnSpPr>
+          <p:spPr>
+            <a:xfrm flipV="1">
+              <a:off x="6032329" y="2638324"/>
+              <a:ext cx="761216" cy="873450"/>
+            </a:xfrm>
+            <a:prstGeom prst="straightConnector1">
+              <a:avLst/>
+            </a:prstGeom>
+            <a:ln>
+              <a:tailEnd type="arrow"/>
+            </a:ln>
+          </p:spPr>
+          <p:style>
+            <a:lnRef idx="2">
+              <a:schemeClr val="accent1"/>
+            </a:lnRef>
+            <a:fillRef idx="0">
+              <a:schemeClr val="accent1"/>
+            </a:fillRef>
+            <a:effectRef idx="1">
+              <a:schemeClr val="accent1"/>
+            </a:effectRef>
+            <a:fontRef idx="minor">
+              <a:schemeClr val="tx1"/>
+            </a:fontRef>
+          </p:style>
+        </p:cxnSp>
+        <p:cxnSp>
+          <p:nvCxnSpPr>
+            <p:cNvPr id="68" name="Straight Arrow Connector 67"/>
+            <p:cNvCxnSpPr/>
+            <p:nvPr/>
+          </p:nvCxnSpPr>
+          <p:spPr>
+            <a:xfrm flipH="1">
+              <a:off x="7000876" y="2722497"/>
+              <a:ext cx="89157" cy="736693"/>
+            </a:xfrm>
+            <a:prstGeom prst="straightConnector1">
+              <a:avLst/>
+            </a:prstGeom>
+            <a:ln>
+              <a:tailEnd type="arrow"/>
+            </a:ln>
+          </p:spPr>
+          <p:style>
+            <a:lnRef idx="2">
+              <a:schemeClr val="accent1"/>
+            </a:lnRef>
+            <a:fillRef idx="0">
+              <a:schemeClr val="accent1"/>
+            </a:fillRef>
+            <a:effectRef idx="1">
+              <a:schemeClr val="accent1"/>
+            </a:effectRef>
+            <a:fontRef idx="minor">
+              <a:schemeClr val="tx1"/>
+            </a:fontRef>
+          </p:style>
+        </p:cxnSp>
+        <p:cxnSp>
+          <p:nvCxnSpPr>
+            <p:cNvPr id="70" name="Straight Arrow Connector 69"/>
+            <p:cNvCxnSpPr/>
+            <p:nvPr/>
+          </p:nvCxnSpPr>
+          <p:spPr>
+            <a:xfrm rot="5400000">
+              <a:off x="4562475" y="905689"/>
+              <a:ext cx="468313" cy="1587"/>
+            </a:xfrm>
+            <a:prstGeom prst="straightConnector1">
+              <a:avLst/>
+            </a:prstGeom>
+            <a:ln>
+              <a:headEnd type="arrow"/>
+              <a:tailEnd type="arrow"/>
+            </a:ln>
+          </p:spPr>
+          <p:style>
+            <a:lnRef idx="3">
+              <a:schemeClr val="accent4"/>
+            </a:lnRef>
+            <a:fillRef idx="0">
+              <a:schemeClr val="accent4"/>
+            </a:fillRef>
+            <a:effectRef idx="2">
+              <a:schemeClr val="accent4"/>
+            </a:effectRef>
+            <a:fontRef idx="minor">
+              <a:schemeClr val="tx1"/>
+            </a:fontRef>
+          </p:style>
+        </p:cxnSp>
+        <p:cxnSp>
+          <p:nvCxnSpPr>
+            <p:cNvPr id="71" name="Straight Arrow Connector 70"/>
+            <p:cNvCxnSpPr/>
+            <p:nvPr/>
+          </p:nvCxnSpPr>
+          <p:spPr>
+            <a:xfrm rot="5400000">
+              <a:off x="6046787" y="905689"/>
+              <a:ext cx="468313" cy="1588"/>
+            </a:xfrm>
+            <a:prstGeom prst="straightConnector1">
+              <a:avLst/>
+            </a:prstGeom>
+            <a:ln>
+              <a:headEnd type="arrow"/>
+              <a:tailEnd type="arrow"/>
+            </a:ln>
+          </p:spPr>
+          <p:style>
+            <a:lnRef idx="3">
+              <a:schemeClr val="accent4"/>
+            </a:lnRef>
+            <a:fillRef idx="0">
+              <a:schemeClr val="accent4"/>
+            </a:fillRef>
+            <a:effectRef idx="2">
+              <a:schemeClr val="accent4"/>
+            </a:effectRef>
+            <a:fontRef idx="minor">
+              <a:schemeClr val="tx1"/>
+            </a:fontRef>
+          </p:style>
+        </p:cxnSp>
+        <p:cxnSp>
+          <p:nvCxnSpPr>
+            <p:cNvPr id="73" name="Straight Arrow Connector 72"/>
+            <p:cNvCxnSpPr/>
+            <p:nvPr/>
+          </p:nvCxnSpPr>
+          <p:spPr>
+            <a:xfrm flipH="1">
+              <a:off x="1418493" y="1574026"/>
+              <a:ext cx="1077058" cy="597950"/>
+            </a:xfrm>
+            <a:prstGeom prst="straightConnector1">
+              <a:avLst/>
+            </a:prstGeom>
+            <a:ln>
+              <a:tailEnd type="arrow"/>
+            </a:ln>
+          </p:spPr>
+          <p:style>
+            <a:lnRef idx="2">
+              <a:schemeClr val="accent1"/>
+            </a:lnRef>
+            <a:fillRef idx="0">
+              <a:schemeClr val="accent1"/>
+            </a:fillRef>
+            <a:effectRef idx="1">
+              <a:schemeClr val="accent1"/>
+            </a:effectRef>
+            <a:fontRef idx="minor">
+              <a:schemeClr val="tx1"/>
+            </a:fontRef>
+          </p:style>
+        </p:cxnSp>
+        <p:cxnSp>
+          <p:nvCxnSpPr>
+            <p:cNvPr id="74" name="Straight Arrow Connector 73"/>
+            <p:cNvCxnSpPr/>
+            <p:nvPr/>
+          </p:nvCxnSpPr>
+          <p:spPr>
+            <a:xfrm flipH="1" flipV="1">
+              <a:off x="7000876" y="1574027"/>
+              <a:ext cx="1157475" cy="679769"/>
+            </a:xfrm>
+            <a:prstGeom prst="straightConnector1">
+              <a:avLst/>
+            </a:prstGeom>
+            <a:ln>
+              <a:tailEnd type="arrow"/>
+            </a:ln>
+          </p:spPr>
+          <p:style>
+            <a:lnRef idx="2">
+              <a:schemeClr val="accent1"/>
+            </a:lnRef>
+            <a:fillRef idx="0">
+              <a:schemeClr val="accent1"/>
+            </a:fillRef>
+            <a:effectRef idx="1">
+              <a:schemeClr val="accent1"/>
+            </a:effectRef>
+            <a:fontRef idx="minor">
+              <a:schemeClr val="tx1"/>
+            </a:fontRef>
+          </p:style>
+        </p:cxnSp>
+        <p:pic>
+          <p:nvPicPr>
+            <p:cNvPr id="9" name="Picture 7" descr="server.tiff"/>
+            <p:cNvPicPr>
+              <a:picLocks noChangeAspect="1"/>
+            </p:cNvPicPr>
+            <p:nvPr/>
+          </p:nvPicPr>
+          <p:blipFill>
+            <a:blip r:embed="rId3"/>
+            <a:srcRect/>
+            <a:stretch>
+              <a:fillRect/>
+            </a:stretch>
+          </p:blipFill>
+          <p:spPr bwMode="auto">
+            <a:xfrm>
+              <a:off x="6260169" y="4693361"/>
+              <a:ext cx="407988" cy="923925"/>
+            </a:xfrm>
+            <a:prstGeom prst="rect">
+              <a:avLst/>
+            </a:prstGeom>
+            <a:noFill/>
+            <a:ln w="9525">
+              <a:noFill/>
+              <a:miter lim="800000"/>
+              <a:headEnd/>
+              <a:tailEnd/>
+            </a:ln>
+          </p:spPr>
+        </p:pic>
+        <p:sp>
+          <p:nvSpPr>
+            <p:cNvPr id="77" name="Right Arrow 76"/>
+            <p:cNvSpPr/>
+            <p:nvPr/>
+          </p:nvSpPr>
+          <p:spPr>
+            <a:xfrm>
+              <a:off x="7525336" y="2321739"/>
+              <a:ext cx="409002" cy="217487"/>
+            </a:xfrm>
+            <a:prstGeom prst="rightArrow">
+              <a:avLst/>
+            </a:prstGeom>
+          </p:spPr>
+          <p:style>
+            <a:lnRef idx="1">
+              <a:schemeClr val="accent3"/>
+            </a:lnRef>
+            <a:fillRef idx="3">
+              <a:schemeClr val="accent3"/>
+            </a:fillRef>
+            <a:effectRef idx="2">
+              <a:schemeClr val="accent3"/>
+            </a:effectRef>
+            <a:fontRef idx="minor">
+              <a:schemeClr val="lt1"/>
+            </a:fontRef>
+          </p:style>
+          <p:txBody>
+            <a:bodyPr anchor="ctr"/>
+            <a:lstStyle/>
+            <a:p>
+              <a:pPr algn="ctr" fontAlgn="auto">
+                <a:spcBef>
+                  <a:spcPts val="0"/>
+                </a:spcBef>
+                <a:spcAft>
+                  <a:spcPts val="0"/>
+                </a:spcAft>
+                <a:defRPr/>
+              </a:pPr>
+              <a:endParaRPr lang="en-US">
+                <a:solidFill>
+                  <a:srgbClr val="008000"/>
+                </a:solidFill>
+              </a:endParaRPr>
+            </a:p>
+          </p:txBody>
+        </p:sp>
+        <p:pic>
+          <p:nvPicPr>
+            <p:cNvPr id="94" name="Picture 4" descr="server.tiff"/>
+            <p:cNvPicPr>
+              <a:picLocks noChangeAspect="1"/>
+            </p:cNvPicPr>
+            <p:nvPr/>
+          </p:nvPicPr>
+          <p:blipFill>
+            <a:blip r:embed="rId3"/>
+            <a:srcRect/>
+            <a:stretch>
+              <a:fillRect/>
+            </a:stretch>
+          </p:blipFill>
+          <p:spPr bwMode="auto">
+            <a:xfrm>
+              <a:off x="2392799" y="4693361"/>
+              <a:ext cx="406400" cy="923925"/>
+            </a:xfrm>
+            <a:prstGeom prst="rect">
+              <a:avLst/>
+            </a:prstGeom>
+            <a:noFill/>
+            <a:ln w="9525">
+              <a:noFill/>
+              <a:miter lim="800000"/>
+              <a:headEnd/>
+              <a:tailEnd/>
+            </a:ln>
+          </p:spPr>
+        </p:pic>
+        <p:sp>
+          <p:nvSpPr>
+            <p:cNvPr id="95" name="Rounded Rectangle 94"/>
+            <p:cNvSpPr/>
+            <p:nvPr/>
+          </p:nvSpPr>
+          <p:spPr>
+            <a:xfrm>
+              <a:off x="1418493" y="5737652"/>
+              <a:ext cx="6094412" cy="314325"/>
+            </a:xfrm>
+            <a:prstGeom prst="roundRect">
+              <a:avLst/>
+            </a:prstGeom>
+          </p:spPr>
+          <p:style>
+            <a:lnRef idx="1">
+              <a:schemeClr val="accent1"/>
+            </a:lnRef>
+            <a:fillRef idx="3">
+              <a:schemeClr val="accent1"/>
+            </a:fillRef>
+            <a:effectRef idx="2">
+              <a:schemeClr val="accent1"/>
+            </a:effectRef>
+            <a:fontRef idx="minor">
+              <a:schemeClr val="lt1"/>
+            </a:fontRef>
+          </p:style>
+          <p:txBody>
+            <a:bodyPr anchor="ctr"/>
+            <a:lstStyle/>
+            <a:p>
+              <a:pPr algn="ctr" fontAlgn="auto">
+                <a:spcBef>
+                  <a:spcPts val="0"/>
+                </a:spcBef>
+                <a:spcAft>
+                  <a:spcPts val="0"/>
+                </a:spcAft>
+                <a:defRPr/>
+              </a:pPr>
+              <a:r>
+                <a:rPr lang="en-US" dirty="0" smtClean="0">
+                  <a:solidFill>
+                    <a:schemeClr val="tx1"/>
+                  </a:solidFill>
+                </a:rPr>
+                <a:t>Parallel computing servers</a:t>
+              </a:r>
+              <a:endParaRPr lang="en-US" dirty="0">
+                <a:solidFill>
+                  <a:schemeClr val="tx1"/>
+                </a:solidFill>
+              </a:endParaRPr>
+            </a:p>
+          </p:txBody>
+        </p:sp>
+        <p:cxnSp>
+          <p:nvCxnSpPr>
+            <p:cNvPr id="107" name="Straight Arrow Connector 106"/>
+            <p:cNvCxnSpPr/>
+            <p:nvPr/>
+          </p:nvCxnSpPr>
+          <p:spPr>
+            <a:xfrm flipH="1" flipV="1">
+              <a:off x="6196014" y="1581618"/>
+              <a:ext cx="652490" cy="599198"/>
+            </a:xfrm>
+            <a:prstGeom prst="straightConnector1">
+              <a:avLst/>
+            </a:prstGeom>
+            <a:ln>
+              <a:tailEnd type="arrow"/>
+            </a:ln>
+          </p:spPr>
+          <p:style>
+            <a:lnRef idx="2">
+              <a:schemeClr val="accent1"/>
+            </a:lnRef>
+            <a:fillRef idx="0">
+              <a:schemeClr val="accent1"/>
+            </a:fillRef>
+            <a:effectRef idx="1">
+              <a:schemeClr val="accent1"/>
+            </a:effectRef>
+            <a:fontRef idx="minor">
+              <a:schemeClr val="tx1"/>
+            </a:fontRef>
+          </p:style>
+        </p:cxnSp>
+        <p:cxnSp>
+          <p:nvCxnSpPr>
+            <p:cNvPr id="112" name="Straight Arrow Connector 111"/>
+            <p:cNvCxnSpPr/>
+            <p:nvPr/>
+          </p:nvCxnSpPr>
+          <p:spPr>
+            <a:xfrm flipH="1">
+              <a:off x="6708751" y="4278239"/>
+              <a:ext cx="84794" cy="551722"/>
+            </a:xfrm>
+            <a:prstGeom prst="straightConnector1">
+              <a:avLst/>
+            </a:prstGeom>
+            <a:ln>
+              <a:headEnd type="arrow"/>
+              <a:tailEnd type="arrow"/>
+            </a:ln>
+          </p:spPr>
+          <p:style>
+            <a:lnRef idx="2">
+              <a:schemeClr val="accent2"/>
+            </a:lnRef>
+            <a:fillRef idx="0">
+              <a:schemeClr val="accent2"/>
+            </a:fillRef>
+            <a:effectRef idx="1">
+              <a:schemeClr val="accent2"/>
+            </a:effectRef>
+            <a:fontRef idx="minor">
+              <a:schemeClr val="tx1"/>
+            </a:fontRef>
+          </p:style>
+        </p:cxnSp>
+        <p:sp>
+          <p:nvSpPr>
+            <p:cNvPr id="115" name="Rectangle 114"/>
+            <p:cNvSpPr/>
+            <p:nvPr/>
+          </p:nvSpPr>
+          <p:spPr>
+            <a:xfrm>
+              <a:off x="5233719" y="3077433"/>
+              <a:ext cx="2824578" cy="1558192"/>
+            </a:xfrm>
+            <a:prstGeom prst="rect">
+              <a:avLst/>
+            </a:prstGeom>
+            <a:noFill/>
+            <a:ln>
+              <a:prstDash val="dash"/>
+            </a:ln>
+          </p:spPr>
+          <p:style>
+            <a:lnRef idx="2">
+              <a:schemeClr val="dk1"/>
+            </a:lnRef>
+            <a:fillRef idx="1">
+              <a:schemeClr val="lt1"/>
+            </a:fillRef>
+            <a:effectRef idx="0">
+              <a:schemeClr val="dk1"/>
+            </a:effectRef>
+            <a:fontRef idx="minor">
+              <a:schemeClr val="dk1"/>
+            </a:fontRef>
+          </p:style>
+          <p:txBody>
+            <a:bodyPr rtlCol="0" anchor="ctr"/>
+            <a:lstStyle/>
+            <a:p>
+              <a:pPr algn="ctr"/>
+              <a:endParaRPr lang="en-US"/>
+            </a:p>
+          </p:txBody>
+        </p:sp>
+        <p:sp>
+          <p:nvSpPr>
+            <p:cNvPr id="116" name="TextBox 115"/>
+            <p:cNvSpPr txBox="1"/>
+            <p:nvPr/>
+          </p:nvSpPr>
+          <p:spPr>
+            <a:xfrm>
+              <a:off x="7186966" y="3989591"/>
+              <a:ext cx="918077" cy="646331"/>
+            </a:xfrm>
+            <a:prstGeom prst="rect">
+              <a:avLst/>
+            </a:prstGeom>
+            <a:noFill/>
+          </p:spPr>
+          <p:txBody>
+            <a:bodyPr wrap="none" rtlCol="0">
+              <a:spAutoFit/>
+            </a:bodyPr>
+            <a:lstStyle/>
+            <a:p>
+              <a:r>
+                <a:rPr lang="en-US" dirty="0" smtClean="0"/>
+                <a:t>Data</a:t>
+              </a:r>
+            </a:p>
+            <a:p>
+              <a:r>
+                <a:rPr lang="en-US" dirty="0" smtClean="0"/>
+                <a:t>analysis</a:t>
+              </a:r>
+              <a:endParaRPr lang="en-US" dirty="0"/>
+            </a:p>
+          </p:txBody>
+        </p:sp>
+        <p:sp>
+          <p:nvSpPr>
+            <p:cNvPr id="117" name="Rectangle 116"/>
+            <p:cNvSpPr/>
+            <p:nvPr/>
+          </p:nvSpPr>
+          <p:spPr>
+            <a:xfrm>
+              <a:off x="886871" y="3074013"/>
+              <a:ext cx="4193129" cy="1558192"/>
+            </a:xfrm>
+            <a:prstGeom prst="rect">
+              <a:avLst/>
+            </a:prstGeom>
+            <a:noFill/>
+            <a:ln>
+              <a:prstDash val="dash"/>
+            </a:ln>
+          </p:spPr>
+          <p:style>
+            <a:lnRef idx="2">
+              <a:schemeClr val="dk1"/>
+            </a:lnRef>
+            <a:fillRef idx="1">
+              <a:schemeClr val="lt1"/>
+            </a:fillRef>
+            <a:effectRef idx="0">
+              <a:schemeClr val="dk1"/>
+            </a:effectRef>
+            <a:fontRef idx="minor">
+              <a:schemeClr val="dk1"/>
+            </a:fontRef>
+          </p:style>
+          <p:txBody>
+            <a:bodyPr rtlCol="0" anchor="ctr"/>
+            <a:lstStyle/>
+            <a:p>
+              <a:pPr algn="ctr"/>
+              <a:endParaRPr lang="en-US"/>
+            </a:p>
+          </p:txBody>
+        </p:sp>
+        <p:sp>
+          <p:nvSpPr>
+            <p:cNvPr id="118" name="TextBox 117"/>
+            <p:cNvSpPr txBox="1"/>
+            <p:nvPr/>
+          </p:nvSpPr>
+          <p:spPr>
+            <a:xfrm>
+              <a:off x="886872" y="3990152"/>
+              <a:ext cx="1295772" cy="646331"/>
+            </a:xfrm>
+            <a:prstGeom prst="rect">
+              <a:avLst/>
+            </a:prstGeom>
+            <a:noFill/>
+          </p:spPr>
+          <p:txBody>
+            <a:bodyPr wrap="none" rtlCol="0">
+              <a:spAutoFit/>
+            </a:bodyPr>
+            <a:lstStyle/>
+            <a:p>
+              <a:r>
+                <a:rPr lang="en-US" dirty="0" smtClean="0"/>
+                <a:t>Data</a:t>
+              </a:r>
+            </a:p>
+            <a:p>
+              <a:r>
+                <a:rPr lang="en-US" dirty="0" smtClean="0"/>
+                <a:t>preparation</a:t>
+              </a:r>
+              <a:endParaRPr lang="en-US" dirty="0"/>
+            </a:p>
+          </p:txBody>
+        </p:sp>
+        <p:cxnSp>
+          <p:nvCxnSpPr>
+            <p:cNvPr id="119" name="Straight Arrow Connector 118"/>
+            <p:cNvCxnSpPr/>
+            <p:nvPr/>
+          </p:nvCxnSpPr>
+          <p:spPr>
+            <a:xfrm flipV="1">
+              <a:off x="3420357" y="2722497"/>
+              <a:ext cx="579264" cy="789276"/>
+            </a:xfrm>
+            <a:prstGeom prst="straightConnector1">
+              <a:avLst/>
+            </a:prstGeom>
+            <a:ln>
+              <a:tailEnd type="arrow"/>
+            </a:ln>
+          </p:spPr>
+          <p:style>
+            <a:lnRef idx="2">
+              <a:schemeClr val="accent1"/>
+            </a:lnRef>
+            <a:fillRef idx="0">
+              <a:schemeClr val="accent1"/>
+            </a:fillRef>
+            <a:effectRef idx="1">
+              <a:schemeClr val="accent1"/>
+            </a:effectRef>
+            <a:fontRef idx="minor">
+              <a:schemeClr val="tx1"/>
+            </a:fontRef>
+          </p:style>
+        </p:cxnSp>
+        <p:sp>
+          <p:nvSpPr>
+            <p:cNvPr id="125" name="Diamond 124"/>
+            <p:cNvSpPr/>
+            <p:nvPr/>
+          </p:nvSpPr>
+          <p:spPr>
+            <a:xfrm>
+              <a:off x="5119275" y="2171976"/>
+              <a:ext cx="781050" cy="515937"/>
+            </a:xfrm>
+            <a:prstGeom prst="diamond">
+              <a:avLst/>
+            </a:prstGeom>
+          </p:spPr>
+          <p:style>
+            <a:lnRef idx="1">
+              <a:schemeClr val="accent1"/>
+            </a:lnRef>
+            <a:fillRef idx="3">
+              <a:schemeClr val="accent1"/>
+            </a:fillRef>
+            <a:effectRef idx="2">
+              <a:schemeClr val="accent1"/>
+            </a:effectRef>
+            <a:fontRef idx="minor">
+              <a:schemeClr val="lt1"/>
+            </a:fontRef>
+          </p:style>
+          <p:txBody>
+            <a:bodyPr anchor="ctr"/>
+            <a:lstStyle/>
+            <a:p>
+              <a:pPr algn="ctr" fontAlgn="auto">
+                <a:spcBef>
+                  <a:spcPts val="0"/>
+                </a:spcBef>
+                <a:spcAft>
+                  <a:spcPts val="0"/>
+                </a:spcAft>
+                <a:defRPr/>
+              </a:pPr>
+              <a:endParaRPr lang="en-US"/>
+            </a:p>
+          </p:txBody>
+        </p:sp>
+        <p:sp>
+          <p:nvSpPr>
+            <p:cNvPr id="126" name="TextBox 109"/>
+            <p:cNvSpPr txBox="1">
+              <a:spLocks noChangeArrowheads="1"/>
+            </p:cNvSpPr>
+            <p:nvPr/>
+          </p:nvSpPr>
+          <p:spPr bwMode="auto">
+            <a:xfrm>
+              <a:off x="5147348" y="2219212"/>
+              <a:ext cx="746781" cy="400110"/>
+            </a:xfrm>
+            <a:prstGeom prst="rect">
+              <a:avLst/>
+            </a:prstGeom>
+            <a:noFill/>
+            <a:ln w="9525">
+              <a:noFill/>
+              <a:miter lim="800000"/>
+              <a:headEnd/>
+              <a:tailEnd/>
+            </a:ln>
+          </p:spPr>
+          <p:txBody>
+            <a:bodyPr wrap="none">
+              <a:prstTxWarp prst="textNoShape">
+                <a:avLst/>
+              </a:prstTxWarp>
+              <a:spAutoFit/>
+            </a:bodyPr>
+            <a:lstStyle/>
+            <a:p>
+              <a:pPr algn="ctr"/>
+              <a:r>
+                <a:rPr lang="en-US" sz="1000" dirty="0" smtClean="0">
+                  <a:latin typeface="Calibri" pitchFamily="-106" charset="0"/>
+                </a:rPr>
+                <a:t>Co-located</a:t>
+              </a:r>
+              <a:endParaRPr lang="en-US" sz="1000" dirty="0" smtClean="0">
+                <a:latin typeface="Calibri" pitchFamily="-106" charset="0"/>
+              </a:endParaRPr>
+            </a:p>
+            <a:p>
+              <a:pPr algn="ctr"/>
+              <a:r>
+                <a:rPr lang="en-US" sz="1000" dirty="0" smtClean="0">
+                  <a:latin typeface="Calibri" pitchFamily="-106" charset="0"/>
+                </a:rPr>
+                <a:t>data</a:t>
+              </a:r>
+              <a:endParaRPr lang="en-US" sz="1000" dirty="0">
+                <a:latin typeface="Calibri" pitchFamily="-106" charset="0"/>
+              </a:endParaRPr>
+            </a:p>
+          </p:txBody>
+        </p:sp>
+        <p:sp>
+          <p:nvSpPr>
+            <p:cNvPr id="127" name="Right Arrow 126"/>
+            <p:cNvSpPr/>
+            <p:nvPr/>
+          </p:nvSpPr>
+          <p:spPr>
+            <a:xfrm>
+              <a:off x="4654419" y="2317524"/>
+              <a:ext cx="420905" cy="215900"/>
+            </a:xfrm>
+            <a:prstGeom prst="rightArrow">
+              <a:avLst/>
+            </a:prstGeom>
+          </p:spPr>
+          <p:style>
+            <a:lnRef idx="1">
+              <a:schemeClr val="accent3"/>
+            </a:lnRef>
+            <a:fillRef idx="3">
+              <a:schemeClr val="accent3"/>
+            </a:fillRef>
+            <a:effectRef idx="2">
+              <a:schemeClr val="accent3"/>
+            </a:effectRef>
+            <a:fontRef idx="minor">
+              <a:schemeClr val="lt1"/>
+            </a:fontRef>
+          </p:style>
+          <p:txBody>
+            <a:bodyPr anchor="ctr"/>
+            <a:lstStyle/>
+            <a:p>
+              <a:pPr algn="ctr" fontAlgn="auto">
+                <a:spcBef>
+                  <a:spcPts val="0"/>
+                </a:spcBef>
+                <a:spcAft>
+                  <a:spcPts val="0"/>
+                </a:spcAft>
+                <a:defRPr/>
+              </a:pPr>
+              <a:endParaRPr lang="en-US">
+                <a:solidFill>
+                  <a:srgbClr val="008000"/>
+                </a:solidFill>
+              </a:endParaRPr>
+            </a:p>
+          </p:txBody>
+        </p:sp>
+        <p:cxnSp>
+          <p:nvCxnSpPr>
+            <p:cNvPr id="133" name="Straight Arrow Connector 132"/>
+            <p:cNvCxnSpPr/>
+            <p:nvPr/>
+          </p:nvCxnSpPr>
+          <p:spPr>
+            <a:xfrm>
+              <a:off x="4333988" y="2687913"/>
+              <a:ext cx="323737" cy="771277"/>
+            </a:xfrm>
+            <a:prstGeom prst="straightConnector1">
+              <a:avLst/>
+            </a:prstGeom>
+            <a:ln>
+              <a:tailEnd type="arrow"/>
+            </a:ln>
+          </p:spPr>
+          <p:style>
+            <a:lnRef idx="2">
+              <a:schemeClr val="accent1"/>
+            </a:lnRef>
+            <a:fillRef idx="0">
+              <a:schemeClr val="accent1"/>
+            </a:fillRef>
+            <a:effectRef idx="1">
+              <a:schemeClr val="accent1"/>
+            </a:effectRef>
+            <a:fontRef idx="minor">
+              <a:schemeClr val="tx1"/>
+            </a:fontRef>
+          </p:style>
+        </p:cxnSp>
+        <p:cxnSp>
+          <p:nvCxnSpPr>
+            <p:cNvPr id="141" name="Straight Arrow Connector 140"/>
+            <p:cNvCxnSpPr/>
+            <p:nvPr/>
+          </p:nvCxnSpPr>
+          <p:spPr>
+            <a:xfrm>
+              <a:off x="5812846" y="2638324"/>
+              <a:ext cx="747382" cy="873450"/>
+            </a:xfrm>
+            <a:prstGeom prst="straightConnector1">
+              <a:avLst/>
+            </a:prstGeom>
+            <a:ln>
+              <a:tailEnd type="arrow"/>
+            </a:ln>
+          </p:spPr>
+          <p:style>
+            <a:lnRef idx="2">
+              <a:schemeClr val="accent1"/>
+            </a:lnRef>
+            <a:fillRef idx="0">
+              <a:schemeClr val="accent1"/>
+            </a:fillRef>
+            <a:effectRef idx="1">
+              <a:schemeClr val="accent1"/>
+            </a:effectRef>
+            <a:fontRef idx="minor">
+              <a:schemeClr val="tx1"/>
+            </a:fontRef>
+          </p:style>
+        </p:cxnSp>
+      </p:grpSp>
+    </p:spTree>
+    <p:extLst>
+      <p:ext uri="{BB962C8B-B14F-4D97-AF65-F5344CB8AC3E}">
+        <p14:creationId xmlns:p14="http://schemas.microsoft.com/office/powerpoint/2010/main" val="2270193486"/>
+      </p:ext>
+    </p:extLst>
+  </p:cSld>
+  <p:clrMapOvr>
+    <a:masterClrMapping/>
+  </p:clrMapOvr>
+  <p:timing>
+    <p:tnLst>
+      <p:par>
+        <p:cTn xmlns:p14="http://schemas.microsoft.com/office/powerpoint/2010/main" id="1" dur="indefinite" restart="never" nodeType="tmRoot"/>
+      </p:par>
+    </p:tnLst>
+  </p:timing>
+</p:sld>
+</file>
+
 <file path=ppt/theme/theme1.xml><?xml version="1.0" encoding="utf-8"?>
 <a:theme xmlns:a="http://schemas.openxmlformats.org/drawingml/2006/main" name="Office Theme">
   <a:themeElements>

</xml_diff>